<commit_message>
c07, move old c07 -> c08 -> c09
</commit_message>
<xml_diff>
--- a/prezentacie/c08w.pptx
+++ b/prezentacie/c08w.pptx
@@ -12,11 +12,12 @@
     <p:sldId id="289" r:id="rId6"/>
     <p:sldId id="290" r:id="rId7"/>
     <p:sldId id="291" r:id="rId8"/>
-    <p:sldId id="298" r:id="rId9"/>
-    <p:sldId id="299" r:id="rId10"/>
-    <p:sldId id="300" r:id="rId11"/>
-    <p:sldId id="301" r:id="rId12"/>
-    <p:sldId id="302" r:id="rId13"/>
+    <p:sldId id="292" r:id="rId9"/>
+    <p:sldId id="293" r:id="rId10"/>
+    <p:sldId id="294" r:id="rId11"/>
+    <p:sldId id="295" r:id="rId12"/>
+    <p:sldId id="296" r:id="rId13"/>
+    <p:sldId id="297" r:id="rId14"/>
   </p:sldIdLst>
   <p:sldSz cx="12192000" cy="6858000"/>
   <p:notesSz cx="6858000" cy="9144000"/>
@@ -254,7 +255,7 @@
           <a:p>
             <a:fld id="{10052495-8BC8-4CFB-94B1-B0429F101A0D}" type="datetimeFigureOut">
               <a:rPr lang="sk-SK" smtClean="0"/>
-              <a:t>16. 10. 2025</a:t>
+              <a:t>10. 10. 2025</a:t>
             </a:fld>
             <a:endParaRPr lang="sk-SK"/>
           </a:p>
@@ -424,7 +425,7 @@
           <a:p>
             <a:fld id="{10052495-8BC8-4CFB-94B1-B0429F101A0D}" type="datetimeFigureOut">
               <a:rPr lang="sk-SK" smtClean="0"/>
-              <a:t>16. 10. 2025</a:t>
+              <a:t>10. 10. 2025</a:t>
             </a:fld>
             <a:endParaRPr lang="sk-SK"/>
           </a:p>
@@ -604,7 +605,7 @@
           <a:p>
             <a:fld id="{10052495-8BC8-4CFB-94B1-B0429F101A0D}" type="datetimeFigureOut">
               <a:rPr lang="sk-SK" smtClean="0"/>
-              <a:t>16. 10. 2025</a:t>
+              <a:t>10. 10. 2025</a:t>
             </a:fld>
             <a:endParaRPr lang="sk-SK"/>
           </a:p>
@@ -774,7 +775,7 @@
           <a:p>
             <a:fld id="{10052495-8BC8-4CFB-94B1-B0429F101A0D}" type="datetimeFigureOut">
               <a:rPr lang="sk-SK" smtClean="0"/>
-              <a:t>16. 10. 2025</a:t>
+              <a:t>10. 10. 2025</a:t>
             </a:fld>
             <a:endParaRPr lang="sk-SK"/>
           </a:p>
@@ -1020,7 +1021,7 @@
           <a:p>
             <a:fld id="{10052495-8BC8-4CFB-94B1-B0429F101A0D}" type="datetimeFigureOut">
               <a:rPr lang="sk-SK" smtClean="0"/>
-              <a:t>16. 10. 2025</a:t>
+              <a:t>10. 10. 2025</a:t>
             </a:fld>
             <a:endParaRPr lang="sk-SK"/>
           </a:p>
@@ -1252,7 +1253,7 @@
           <a:p>
             <a:fld id="{10052495-8BC8-4CFB-94B1-B0429F101A0D}" type="datetimeFigureOut">
               <a:rPr lang="sk-SK" smtClean="0"/>
-              <a:t>16. 10. 2025</a:t>
+              <a:t>10. 10. 2025</a:t>
             </a:fld>
             <a:endParaRPr lang="sk-SK"/>
           </a:p>
@@ -1619,7 +1620,7 @@
           <a:p>
             <a:fld id="{10052495-8BC8-4CFB-94B1-B0429F101A0D}" type="datetimeFigureOut">
               <a:rPr lang="sk-SK" smtClean="0"/>
-              <a:t>16. 10. 2025</a:t>
+              <a:t>10. 10. 2025</a:t>
             </a:fld>
             <a:endParaRPr lang="sk-SK"/>
           </a:p>
@@ -1737,7 +1738,7 @@
           <a:p>
             <a:fld id="{10052495-8BC8-4CFB-94B1-B0429F101A0D}" type="datetimeFigureOut">
               <a:rPr lang="sk-SK" smtClean="0"/>
-              <a:t>16. 10. 2025</a:t>
+              <a:t>10. 10. 2025</a:t>
             </a:fld>
             <a:endParaRPr lang="sk-SK"/>
           </a:p>
@@ -1832,7 +1833,7 @@
           <a:p>
             <a:fld id="{10052495-8BC8-4CFB-94B1-B0429F101A0D}" type="datetimeFigureOut">
               <a:rPr lang="sk-SK" smtClean="0"/>
-              <a:t>16. 10. 2025</a:t>
+              <a:t>10. 10. 2025</a:t>
             </a:fld>
             <a:endParaRPr lang="sk-SK"/>
           </a:p>
@@ -2109,7 +2110,7 @@
           <a:p>
             <a:fld id="{10052495-8BC8-4CFB-94B1-B0429F101A0D}" type="datetimeFigureOut">
               <a:rPr lang="sk-SK" smtClean="0"/>
-              <a:t>16. 10. 2025</a:t>
+              <a:t>10. 10. 2025</a:t>
             </a:fld>
             <a:endParaRPr lang="sk-SK"/>
           </a:p>
@@ -2366,7 +2367,7 @@
           <a:p>
             <a:fld id="{10052495-8BC8-4CFB-94B1-B0429F101A0D}" type="datetimeFigureOut">
               <a:rPr lang="sk-SK" smtClean="0"/>
-              <a:t>16. 10. 2025</a:t>
+              <a:t>10. 10. 2025</a:t>
             </a:fld>
             <a:endParaRPr lang="sk-SK"/>
           </a:p>
@@ -2579,7 +2580,7 @@
           <a:p>
             <a:fld id="{10052495-8BC8-4CFB-94B1-B0429F101A0D}" type="datetimeFigureOut">
               <a:rPr lang="sk-SK" smtClean="0"/>
-              <a:t>16. 10. 2025</a:t>
+              <a:t>10. 10. 2025</a:t>
             </a:fld>
             <a:endParaRPr lang="sk-SK"/>
           </a:p>
@@ -3574,7 +3575,7 @@
         <p:cNvPr id="1" name="">
           <a:extLst>
             <a:ext uri="{FF2B5EF4-FFF2-40B4-BE49-F238E27FC236}">
-              <a16:creationId xmlns:a16="http://schemas.microsoft.com/office/drawing/2014/main" id="{182ECF29-C067-477E-33AE-68167622369A}"/>
+              <a16:creationId xmlns:a16="http://schemas.microsoft.com/office/drawing/2014/main" id="{60C260A4-CA2D-A013-55E5-F6C66D2A912A}"/>
             </a:ext>
           </a:extLst>
         </p:cNvPr>
@@ -3594,7 +3595,7 @@
           <p:cNvPr id="3" name="Zástupný objekt pre obsah 2">
             <a:extLst>
               <a:ext uri="{FF2B5EF4-FFF2-40B4-BE49-F238E27FC236}">
-                <a16:creationId xmlns:a16="http://schemas.microsoft.com/office/drawing/2014/main" id="{6D492497-6BB6-D241-8624-538AB04339A9}"/>
+                <a16:creationId xmlns:a16="http://schemas.microsoft.com/office/drawing/2014/main" id="{B8F6E133-558B-4C4B-7FCF-9D95C467A1B4}"/>
               </a:ext>
             </a:extLst>
           </p:cNvPr>
@@ -3607,8 +3608,8 @@
         </p:nvSpPr>
         <p:spPr>
           <a:xfrm>
-            <a:off x="466344" y="1580558"/>
-            <a:ext cx="11329416" cy="4847673"/>
+            <a:off x="274320" y="1516550"/>
+            <a:ext cx="11759184" cy="4847673"/>
           </a:xfrm>
         </p:spPr>
         <p:txBody>
@@ -3617,13 +3618,126 @@
           </a:bodyPr>
           <a:lstStyle/>
           <a:p>
+            <a:pPr marL="0" indent="0">
+              <a:lnSpc>
+                <a:spcPct val="100000"/>
+              </a:lnSpc>
+              <a:spcBef>
+                <a:spcPts val="0"/>
+              </a:spcBef>
+              <a:buNone/>
+            </a:pPr>
+            <a:r>
+              <a:rPr lang="sk-SK" dirty="0"/>
+              <a:t>Vytvorte nasledovné inštančné metódy v triede </a:t>
+            </a:r>
+            <a:r>
+              <a:rPr lang="sk-SK" dirty="0" err="1">
+                <a:highlight>
+                  <a:srgbClr val="FFFF00"/>
+                </a:highlight>
+                <a:latin typeface="Consolas" panose="020B0609020204030204" pitchFamily="49" charset="0"/>
+              </a:rPr>
+              <a:t>TextoveUI</a:t>
+            </a:r>
+            <a:r>
+              <a:rPr lang="sk-SK" dirty="0"/>
+              <a:t>. V kóde týchto metód použite atribút </a:t>
+            </a:r>
+            <a:r>
+              <a:rPr lang="sk-SK" dirty="0" err="1">
+                <a:highlight>
+                  <a:srgbClr val="FFFF00"/>
+                </a:highlight>
+                <a:latin typeface="Consolas" panose="020B0609020204030204" pitchFamily="49" charset="0"/>
+              </a:rPr>
+              <a:t>scanner</a:t>
+            </a:r>
+            <a:r>
+              <a:rPr lang="sk-SK" dirty="0"/>
+              <a:t> na načítanie hodnôt z klávesnice.</a:t>
+            </a:r>
+          </a:p>
+          <a:p>
+            <a:pPr marL="0" indent="0">
+              <a:lnSpc>
+                <a:spcPct val="100000"/>
+              </a:lnSpc>
+              <a:spcBef>
+                <a:spcPts val="0"/>
+              </a:spcBef>
+              <a:buNone/>
+            </a:pPr>
+            <a:endParaRPr lang="sk-SK" dirty="0"/>
+          </a:p>
+          <a:p>
             <a:pPr marL="514350" indent="-514350">
+              <a:lnSpc>
+                <a:spcPct val="100000"/>
+              </a:lnSpc>
+              <a:spcBef>
+                <a:spcPts val="0"/>
+              </a:spcBef>
               <a:buFont typeface="+mj-lt"/>
               <a:buAutoNum type="arabicPeriod"/>
             </a:pPr>
             <a:r>
+              <a:rPr lang="sk-SK" dirty="0" err="1">
+                <a:highlight>
+                  <a:srgbClr val="FFFF00"/>
+                </a:highlight>
+                <a:latin typeface="Consolas" panose="020B0609020204030204" pitchFamily="49" charset="0"/>
+              </a:rPr>
+              <a:t>public</a:t>
+            </a:r>
+            <a:r>
+              <a:rPr lang="sk-SK" dirty="0">
+                <a:highlight>
+                  <a:srgbClr val="FFFF00"/>
+                </a:highlight>
+                <a:latin typeface="Consolas" panose="020B0609020204030204" pitchFamily="49" charset="0"/>
+              </a:rPr>
+              <a:t> </a:t>
+            </a:r>
+            <a:r>
+              <a:rPr lang="sk-SK" dirty="0" err="1">
+                <a:highlight>
+                  <a:srgbClr val="FFFF00"/>
+                </a:highlight>
+                <a:latin typeface="Consolas" panose="020B0609020204030204" pitchFamily="49" charset="0"/>
+              </a:rPr>
+              <a:t>char</a:t>
+            </a:r>
+            <a:r>
+              <a:rPr lang="sk-SK" dirty="0">
+                <a:highlight>
+                  <a:srgbClr val="FFFF00"/>
+                </a:highlight>
+                <a:latin typeface="Consolas" panose="020B0609020204030204" pitchFamily="49" charset="0"/>
+              </a:rPr>
+              <a:t> </a:t>
+            </a:r>
+            <a:r>
+              <a:rPr lang="sk-SK" dirty="0" err="1">
+                <a:highlight>
+                  <a:srgbClr val="FFFF00"/>
+                </a:highlight>
+                <a:latin typeface="Consolas" panose="020B0609020204030204" pitchFamily="49" charset="0"/>
+              </a:rPr>
+              <a:t>ziskajTip</a:t>
+            </a:r>
+            <a:r>
+              <a:rPr lang="sk-SK" dirty="0">
+                <a:highlight>
+                  <a:srgbClr val="FFFF00"/>
+                </a:highlight>
+                <a:latin typeface="Consolas" panose="020B0609020204030204" pitchFamily="49" charset="0"/>
+              </a:rPr>
+              <a:t>()</a:t>
+            </a:r>
+            <a:r>
               <a:rPr lang="sk-SK" dirty="0"/>
-              <a:t>Do triedy </a:t>
+              <a:t> - vypíše na obrazovku text "Hádaj písmeno: " a načíta jeden znak z klávesnice. Použite metódu </a:t>
             </a:r>
             <a:r>
               <a:rPr lang="sk-SK" dirty="0" err="1">
@@ -3632,11 +3746,20 @@
                 </a:highlight>
                 <a:latin typeface="Consolas" panose="020B0609020204030204" pitchFamily="49" charset="0"/>
               </a:rPr>
-              <a:t>Slovnik</a:t>
+              <a:t>scanner.nextLine</a:t>
+            </a:r>
+            <a:r>
+              <a:rPr lang="sk-SK" dirty="0">
+                <a:highlight>
+                  <a:srgbClr val="FFFF00"/>
+                </a:highlight>
+                <a:latin typeface="Consolas" panose="020B0609020204030204" pitchFamily="49" charset="0"/>
+              </a:rPr>
+              <a:t>()</a:t>
             </a:r>
             <a:r>
               <a:rPr lang="sk-SK" dirty="0"/>
-              <a:t> pridajte továrenskú metódu </a:t>
+              <a:t> a potom pomocou metódy </a:t>
             </a:r>
             <a:r>
               <a:rPr lang="sk-SK" dirty="0" err="1">
@@ -3645,7 +3768,7 @@
                 </a:highlight>
                 <a:latin typeface="Consolas" panose="020B0609020204030204" pitchFamily="49" charset="0"/>
               </a:rPr>
-              <a:t>fromUrl</a:t>
+              <a:t>String#charAt</a:t>
             </a:r>
             <a:r>
               <a:rPr lang="sk-SK" dirty="0">
@@ -3654,178 +3777,101 @@
                 </a:highlight>
                 <a:latin typeface="Consolas" panose="020B0609020204030204" pitchFamily="49" charset="0"/>
               </a:rPr>
-              <a:t>(</a:t>
-            </a:r>
-            <a:r>
-              <a:rPr lang="sk-SK" dirty="0" err="1">
-                <a:highlight>
-                  <a:srgbClr val="FFFF00"/>
-                </a:highlight>
-                <a:latin typeface="Consolas" panose="020B0609020204030204" pitchFamily="49" charset="0"/>
-              </a:rPr>
-              <a:t>String</a:t>
-            </a:r>
-            <a:r>
-              <a:rPr lang="sk-SK" dirty="0">
-                <a:highlight>
-                  <a:srgbClr val="FFFF00"/>
-                </a:highlight>
-                <a:latin typeface="Consolas" panose="020B0609020204030204" pitchFamily="49" charset="0"/>
-              </a:rPr>
-              <a:t> </a:t>
-            </a:r>
-            <a:r>
-              <a:rPr lang="sk-SK" dirty="0" err="1">
-                <a:highlight>
-                  <a:srgbClr val="FFFF00"/>
-                </a:highlight>
-                <a:latin typeface="Consolas" panose="020B0609020204030204" pitchFamily="49" charset="0"/>
-              </a:rPr>
-              <a:t>kategoria</a:t>
-            </a:r>
-            <a:r>
-              <a:rPr lang="sk-SK" dirty="0">
-                <a:highlight>
-                  <a:srgbClr val="FFFF00"/>
-                </a:highlight>
-                <a:latin typeface="Consolas" panose="020B0609020204030204" pitchFamily="49" charset="0"/>
-              </a:rPr>
-              <a:t>, </a:t>
-            </a:r>
-            <a:r>
-              <a:rPr lang="sk-SK" dirty="0" err="1">
-                <a:highlight>
-                  <a:srgbClr val="FFFF00"/>
-                </a:highlight>
-                <a:latin typeface="Consolas" panose="020B0609020204030204" pitchFamily="49" charset="0"/>
-              </a:rPr>
-              <a:t>String</a:t>
-            </a:r>
-            <a:r>
-              <a:rPr lang="sk-SK" dirty="0">
-                <a:highlight>
-                  <a:srgbClr val="FFFF00"/>
-                </a:highlight>
-                <a:latin typeface="Consolas" panose="020B0609020204030204" pitchFamily="49" charset="0"/>
-              </a:rPr>
-              <a:t> </a:t>
-            </a:r>
-            <a:r>
-              <a:rPr lang="sk-SK" dirty="0" err="1">
-                <a:highlight>
-                  <a:srgbClr val="FFFF00"/>
-                </a:highlight>
-                <a:latin typeface="Consolas" panose="020B0609020204030204" pitchFamily="49" charset="0"/>
-              </a:rPr>
-              <a:t>nazov</a:t>
-            </a:r>
-            <a:r>
-              <a:rPr lang="sk-SK" dirty="0">
-                <a:highlight>
-                  <a:srgbClr val="FFFF00"/>
-                </a:highlight>
-                <a:latin typeface="Consolas" panose="020B0609020204030204" pitchFamily="49" charset="0"/>
-              </a:rPr>
-              <a:t>)</a:t>
+              <a:t>()</a:t>
             </a:r>
             <a:r>
               <a:rPr lang="sk-SK" dirty="0"/>
-              <a:t> s kódom z učebnice</a:t>
+              <a:t> vráťte prvý znak, ktorý užívateľ zadal.</a:t>
             </a:r>
           </a:p>
           <a:p>
             <a:pPr marL="514350" indent="-514350">
+              <a:lnSpc>
+                <a:spcPct val="100000"/>
+              </a:lnSpc>
+              <a:spcBef>
+                <a:spcPts val="0"/>
+              </a:spcBef>
               <a:buFont typeface="+mj-lt"/>
               <a:buAutoNum type="arabicPeriod"/>
             </a:pPr>
             <a:r>
+              <a:rPr lang="sk-SK" dirty="0" err="1">
+                <a:highlight>
+                  <a:srgbClr val="FFFF00"/>
+                </a:highlight>
+                <a:latin typeface="Consolas" panose="020B0609020204030204" pitchFamily="49" charset="0"/>
+              </a:rPr>
+              <a:t>public</a:t>
+            </a:r>
+            <a:r>
+              <a:rPr lang="sk-SK" dirty="0">
+                <a:highlight>
+                  <a:srgbClr val="FFFF00"/>
+                </a:highlight>
+                <a:latin typeface="Consolas" panose="020B0609020204030204" pitchFamily="49" charset="0"/>
+              </a:rPr>
+              <a:t> </a:t>
+            </a:r>
+            <a:r>
+              <a:rPr lang="sk-SK" dirty="0" err="1">
+                <a:highlight>
+                  <a:srgbClr val="FFFF00"/>
+                </a:highlight>
+                <a:latin typeface="Consolas" panose="020B0609020204030204" pitchFamily="49" charset="0"/>
+              </a:rPr>
+              <a:t>String</a:t>
+            </a:r>
+            <a:r>
+              <a:rPr lang="sk-SK" dirty="0">
+                <a:highlight>
+                  <a:srgbClr val="FFFF00"/>
+                </a:highlight>
+                <a:latin typeface="Consolas" panose="020B0609020204030204" pitchFamily="49" charset="0"/>
+              </a:rPr>
+              <a:t> </a:t>
+            </a:r>
+            <a:r>
+              <a:rPr lang="sk-SK" dirty="0" err="1">
+                <a:highlight>
+                  <a:srgbClr val="FFFF00"/>
+                </a:highlight>
+                <a:latin typeface="Consolas" panose="020B0609020204030204" pitchFamily="49" charset="0"/>
+              </a:rPr>
+              <a:t>ziskajHadaneSlovo</a:t>
+            </a:r>
+            <a:r>
+              <a:rPr lang="sk-SK" dirty="0">
+                <a:highlight>
+                  <a:srgbClr val="FFFF00"/>
+                </a:highlight>
+                <a:latin typeface="Consolas" panose="020B0609020204030204" pitchFamily="49" charset="0"/>
+              </a:rPr>
+              <a:t>()</a:t>
+            </a:r>
+            <a:r>
               <a:rPr lang="sk-SK" dirty="0"/>
-              <a:t>Importujte všetky novo používané triedy, IDE vám v tom vie pomôcť</a:t>
-            </a:r>
-          </a:p>
-          <a:p>
-            <a:pPr marL="514350" indent="-514350">
-              <a:buFont typeface="+mj-lt"/>
-              <a:buAutoNum type="arabicPeriod"/>
-            </a:pPr>
+              <a:t> - vypíše na obrazovku text "Zadaj slovo, ktoré sa má hádať: " a načíta slovo z klávesnice. Vráti načítané slovo. Po načítaní 'vyčistite' obrazovku napísaním veľkého množstva nových riadkov (znak '</a:t>
+            </a:r>
+            <a:r>
+              <a:rPr lang="sk-SK" dirty="0">
+                <a:highlight>
+                  <a:srgbClr val="FFFF00"/>
+                </a:highlight>
+                <a:latin typeface="Consolas" panose="020B0609020204030204" pitchFamily="49" charset="0"/>
+              </a:rPr>
+              <a:t>\n</a:t>
+            </a:r>
             <a:r>
               <a:rPr lang="sk-SK" dirty="0"/>
-              <a:t>Do triedy </a:t>
-            </a:r>
-            <a:r>
-              <a:rPr lang="sk-SK" dirty="0">
-                <a:highlight>
-                  <a:srgbClr val="FFFF00"/>
-                </a:highlight>
-                <a:latin typeface="Consolas" panose="020B0609020204030204" pitchFamily="49" charset="0"/>
-              </a:rPr>
-              <a:t>Hra</a:t>
-            </a:r>
-            <a:r>
-              <a:rPr lang="sk-SK" dirty="0"/>
-              <a:t> pridajte statickú metódu </a:t>
-            </a:r>
-            <a:r>
-              <a:rPr lang="sk-SK" dirty="0" err="1">
-                <a:highlight>
-                  <a:srgbClr val="FFFF00"/>
-                </a:highlight>
-                <a:latin typeface="Consolas" panose="020B0609020204030204" pitchFamily="49" charset="0"/>
-              </a:rPr>
-              <a:t>getSlovnikVeci</a:t>
-            </a:r>
-            <a:r>
-              <a:rPr lang="sk-SK" dirty="0">
-                <a:highlight>
-                  <a:srgbClr val="FFFF00"/>
-                </a:highlight>
-                <a:latin typeface="Consolas" panose="020B0609020204030204" pitchFamily="49" charset="0"/>
-              </a:rPr>
-              <a:t>()</a:t>
-            </a:r>
-            <a:r>
-              <a:rPr lang="sk-SK" dirty="0"/>
-              <a:t>, ktorá vráti nový slovník vecí, kód je v učebnici</a:t>
-            </a:r>
-          </a:p>
-          <a:p>
-            <a:pPr marL="514350" indent="-514350">
-              <a:buFont typeface="+mj-lt"/>
-              <a:buAutoNum type="arabicPeriod"/>
-            </a:pPr>
-            <a:r>
-              <a:rPr lang="sk-SK" dirty="0"/>
-              <a:t>Upravte metódu </a:t>
-            </a:r>
-            <a:r>
-              <a:rPr lang="sk-SK" dirty="0" err="1">
-                <a:highlight>
-                  <a:srgbClr val="FFFF00"/>
-                </a:highlight>
-                <a:latin typeface="Consolas" panose="020B0609020204030204" pitchFamily="49" charset="0"/>
-              </a:rPr>
-              <a:t>novaTextovaHra</a:t>
-            </a:r>
-            <a:r>
-              <a:rPr lang="sk-SK" dirty="0">
-                <a:highlight>
-                  <a:srgbClr val="FFFF00"/>
-                </a:highlight>
-                <a:latin typeface="Consolas" panose="020B0609020204030204" pitchFamily="49" charset="0"/>
-              </a:rPr>
-              <a:t>()</a:t>
-            </a:r>
-            <a:r>
-              <a:rPr lang="sk-SK" dirty="0"/>
-              <a:t> tak, aby sa použil slovník vecí</a:t>
-            </a:r>
-          </a:p>
-          <a:p>
-            <a:pPr marL="514350" indent="-514350">
-              <a:buFont typeface="+mj-lt"/>
-              <a:buAutoNum type="arabicPeriod"/>
-            </a:pPr>
-            <a:endParaRPr lang="sk-SK" dirty="0"/>
+              <a:t>')</a:t>
+            </a:r>
+            <a:endParaRPr lang="sk-SK" sz="2400" dirty="0">
+              <a:highlight>
+                <a:srgbClr val="FFFF00"/>
+              </a:highlight>
+              <a:latin typeface="Consolas" panose="020B0609020204030204" pitchFamily="49" charset="0"/>
+            </a:endParaRPr>
           </a:p>
         </p:txBody>
       </p:sp>
@@ -3834,7 +3880,7 @@
           <p:cNvPr id="5" name="Nadpis 4">
             <a:extLst>
               <a:ext uri="{FF2B5EF4-FFF2-40B4-BE49-F238E27FC236}">
-                <a16:creationId xmlns:a16="http://schemas.microsoft.com/office/drawing/2014/main" id="{EB2216F9-1A5B-5106-0CCC-D38ED9159EED}"/>
+                <a16:creationId xmlns:a16="http://schemas.microsoft.com/office/drawing/2014/main" id="{E0C32511-6462-9E9B-E18C-99985C45BA66}"/>
               </a:ext>
             </a:extLst>
           </p:cNvPr>
@@ -3854,7 +3900,7 @@
           <a:p>
             <a:r>
               <a:rPr lang="sk-SK" dirty="0"/>
-              <a:t>Úloha 8.8: Slovník z internetu</a:t>
+              <a:t>Úloha 7.6: Získanie vstupu</a:t>
             </a:r>
           </a:p>
         </p:txBody>
@@ -3862,7 +3908,7 @@
     </p:spTree>
     <p:extLst>
       <p:ext uri="{BB962C8B-B14F-4D97-AF65-F5344CB8AC3E}">
-        <p14:creationId xmlns:p14="http://schemas.microsoft.com/office/powerpoint/2010/main" val="2151314034"/>
+        <p14:creationId xmlns:p14="http://schemas.microsoft.com/office/powerpoint/2010/main" val="2917433203"/>
       </p:ext>
     </p:extLst>
   </p:cSld>
@@ -3888,7 +3934,7 @@
         <p:cNvPr id="1" name="">
           <a:extLst>
             <a:ext uri="{FF2B5EF4-FFF2-40B4-BE49-F238E27FC236}">
-              <a16:creationId xmlns:a16="http://schemas.microsoft.com/office/drawing/2014/main" id="{9F682B55-A42E-D06E-A31A-B64C2DAC6E7A}"/>
+              <a16:creationId xmlns:a16="http://schemas.microsoft.com/office/drawing/2014/main" id="{816D5B0D-B51A-09D6-1D4E-EFF691F3FE55}"/>
             </a:ext>
           </a:extLst>
         </p:cNvPr>
@@ -3908,7 +3954,7 @@
           <p:cNvPr id="3" name="Zástupný objekt pre obsah 2">
             <a:extLst>
               <a:ext uri="{FF2B5EF4-FFF2-40B4-BE49-F238E27FC236}">
-                <a16:creationId xmlns:a16="http://schemas.microsoft.com/office/drawing/2014/main" id="{69B68252-7833-BE66-D301-A7385EEC952E}"/>
+                <a16:creationId xmlns:a16="http://schemas.microsoft.com/office/drawing/2014/main" id="{6B5DD4A8-37B9-0962-D595-55F946632F11}"/>
               </a:ext>
             </a:extLst>
           </p:cNvPr>
@@ -3921,8 +3967,8 @@
         </p:nvSpPr>
         <p:spPr>
           <a:xfrm>
-            <a:off x="466344" y="1580558"/>
-            <a:ext cx="11329416" cy="4847673"/>
+            <a:off x="274320" y="1516550"/>
+            <a:ext cx="11759184" cy="4847673"/>
           </a:xfrm>
         </p:spPr>
         <p:txBody>
@@ -3931,92 +3977,283 @@
           </a:bodyPr>
           <a:lstStyle/>
           <a:p>
+            <a:pPr marL="0" indent="0">
+              <a:lnSpc>
+                <a:spcPct val="100000"/>
+              </a:lnSpc>
+              <a:spcBef>
+                <a:spcPts val="0"/>
+              </a:spcBef>
+              <a:buNone/>
+            </a:pPr>
+            <a:r>
+              <a:rPr lang="sk-SK" sz="2400" dirty="0"/>
+              <a:t>Vytvorte nasledovné inštančné metódy v triede </a:t>
+            </a:r>
+            <a:r>
+              <a:rPr lang="sk-SK" sz="2400" dirty="0" err="1">
+                <a:highlight>
+                  <a:srgbClr val="FFFF00"/>
+                </a:highlight>
+                <a:latin typeface="Consolas" panose="020B0609020204030204" pitchFamily="49" charset="0"/>
+              </a:rPr>
+              <a:t>TextoveUI</a:t>
+            </a:r>
+            <a:r>
+              <a:rPr lang="sk-SK" sz="2400" dirty="0"/>
+              <a:t>.</a:t>
+            </a:r>
+          </a:p>
+          <a:p>
+            <a:pPr marL="0" indent="0">
+              <a:lnSpc>
+                <a:spcPct val="100000"/>
+              </a:lnSpc>
+              <a:spcBef>
+                <a:spcPts val="0"/>
+              </a:spcBef>
+              <a:buNone/>
+            </a:pPr>
+            <a:endParaRPr lang="sk-SK" sz="2400" dirty="0"/>
+          </a:p>
+          <a:p>
             <a:pPr marL="514350" indent="-514350">
+              <a:lnSpc>
+                <a:spcPct val="100000"/>
+              </a:lnSpc>
+              <a:spcBef>
+                <a:spcPts val="0"/>
+              </a:spcBef>
               <a:buFont typeface="+mj-lt"/>
               <a:buAutoNum type="arabicPeriod"/>
             </a:pPr>
             <a:r>
-              <a:rPr lang="sk-SK" dirty="0"/>
-              <a:t>Do triedy </a:t>
-            </a:r>
-            <a:r>
-              <a:rPr lang="sk-SK" dirty="0" err="1">
-                <a:highlight>
-                  <a:srgbClr val="FFFF00"/>
-                </a:highlight>
-                <a:latin typeface="Consolas" panose="020B0609020204030204" pitchFamily="49" charset="0"/>
-              </a:rPr>
-              <a:t>TextoveUI</a:t>
-            </a:r>
-            <a:r>
-              <a:rPr lang="sk-SK" dirty="0"/>
-              <a:t> pridajte 2 nové metódy, jednu na získanie názvu kategórie a druhú na získanie samotných slov do slovníka. Kód v učebnici</a:t>
+              <a:rPr lang="sk-SK" sz="2400" dirty="0" err="1">
+                <a:highlight>
+                  <a:srgbClr val="FFFF00"/>
+                </a:highlight>
+                <a:latin typeface="Consolas" panose="020B0609020204030204" pitchFamily="49" charset="0"/>
+              </a:rPr>
+              <a:t>public</a:t>
+            </a:r>
+            <a:r>
+              <a:rPr lang="sk-SK" sz="2400" dirty="0">
+                <a:highlight>
+                  <a:srgbClr val="FFFF00"/>
+                </a:highlight>
+                <a:latin typeface="Consolas" panose="020B0609020204030204" pitchFamily="49" charset="0"/>
+              </a:rPr>
+              <a:t> </a:t>
+            </a:r>
+            <a:r>
+              <a:rPr lang="sk-SK" sz="2400" dirty="0" err="1">
+                <a:highlight>
+                  <a:srgbClr val="FFFF00"/>
+                </a:highlight>
+                <a:latin typeface="Consolas" panose="020B0609020204030204" pitchFamily="49" charset="0"/>
+              </a:rPr>
+              <a:t>void</a:t>
+            </a:r>
+            <a:r>
+              <a:rPr lang="sk-SK" sz="2400" dirty="0">
+                <a:highlight>
+                  <a:srgbClr val="FFFF00"/>
+                </a:highlight>
+                <a:latin typeface="Consolas" panose="020B0609020204030204" pitchFamily="49" charset="0"/>
+              </a:rPr>
+              <a:t> </a:t>
+            </a:r>
+            <a:r>
+              <a:rPr lang="sk-SK" sz="2400" dirty="0" err="1">
+                <a:highlight>
+                  <a:srgbClr val="FFFF00"/>
+                </a:highlight>
+                <a:latin typeface="Consolas" panose="020B0609020204030204" pitchFamily="49" charset="0"/>
+              </a:rPr>
+              <a:t>vypisIntro</a:t>
+            </a:r>
+            <a:r>
+              <a:rPr lang="sk-SK" sz="2400" dirty="0">
+                <a:highlight>
+                  <a:srgbClr val="FFFF00"/>
+                </a:highlight>
+                <a:latin typeface="Consolas" panose="020B0609020204030204" pitchFamily="49" charset="0"/>
+              </a:rPr>
+              <a:t>()</a:t>
+            </a:r>
+            <a:r>
+              <a:rPr lang="sk-SK" sz="2400" dirty="0"/>
+              <a:t> - vypíše text "Vitaj v hre Obesenec!". Text môžete pekne orámovať, ak chcete.</a:t>
             </a:r>
           </a:p>
           <a:p>
             <a:pPr marL="514350" indent="-514350">
+              <a:lnSpc>
+                <a:spcPct val="100000"/>
+              </a:lnSpc>
+              <a:spcBef>
+                <a:spcPts val="0"/>
+              </a:spcBef>
               <a:buFont typeface="+mj-lt"/>
               <a:buAutoNum type="arabicPeriod"/>
             </a:pPr>
             <a:r>
-              <a:rPr lang="sk-SK" dirty="0"/>
-              <a:t>V triede </a:t>
-            </a:r>
-            <a:r>
-              <a:rPr lang="sk-SK" dirty="0" err="1">
-                <a:highlight>
-                  <a:srgbClr val="FFFF00"/>
-                </a:highlight>
-                <a:latin typeface="Consolas" panose="020B0609020204030204" pitchFamily="49" charset="0"/>
-              </a:rPr>
-              <a:t>Slovnik</a:t>
-            </a:r>
-            <a:r>
-              <a:rPr lang="sk-SK" dirty="0"/>
-              <a:t> vytvorte nový </a:t>
-            </a:r>
-            <a:r>
-              <a:rPr lang="sk-SK" dirty="0" err="1"/>
-              <a:t>defaultný</a:t>
-            </a:r>
-            <a:r>
-              <a:rPr lang="sk-SK" dirty="0"/>
-              <a:t> konštruktor, ktorý bude načítavať dáta z klávesnice. Kód v učebnici</a:t>
+              <a:rPr lang="sk-SK" sz="2400" dirty="0" err="1">
+                <a:highlight>
+                  <a:srgbClr val="FFFF00"/>
+                </a:highlight>
+                <a:latin typeface="Consolas" panose="020B0609020204030204" pitchFamily="49" charset="0"/>
+              </a:rPr>
+              <a:t>public</a:t>
+            </a:r>
+            <a:r>
+              <a:rPr lang="sk-SK" sz="2400" dirty="0">
+                <a:highlight>
+                  <a:srgbClr val="FFFF00"/>
+                </a:highlight>
+                <a:latin typeface="Consolas" panose="020B0609020204030204" pitchFamily="49" charset="0"/>
+              </a:rPr>
+              <a:t> </a:t>
+            </a:r>
+            <a:r>
+              <a:rPr lang="sk-SK" sz="2400" dirty="0" err="1">
+                <a:highlight>
+                  <a:srgbClr val="FFFF00"/>
+                </a:highlight>
+                <a:latin typeface="Consolas" panose="020B0609020204030204" pitchFamily="49" charset="0"/>
+              </a:rPr>
+              <a:t>void</a:t>
+            </a:r>
+            <a:r>
+              <a:rPr lang="sk-SK" sz="2400" dirty="0">
+                <a:highlight>
+                  <a:srgbClr val="FFFF00"/>
+                </a:highlight>
+                <a:latin typeface="Consolas" panose="020B0609020204030204" pitchFamily="49" charset="0"/>
+              </a:rPr>
+              <a:t> </a:t>
+            </a:r>
+            <a:r>
+              <a:rPr lang="sk-SK" sz="2400" dirty="0" err="1">
+                <a:highlight>
+                  <a:srgbClr val="FFFF00"/>
+                </a:highlight>
+                <a:latin typeface="Consolas" panose="020B0609020204030204" pitchFamily="49" charset="0"/>
+              </a:rPr>
+              <a:t>vypisStavHry</a:t>
+            </a:r>
+            <a:r>
+              <a:rPr lang="sk-SK" sz="2400" dirty="0">
+                <a:highlight>
+                  <a:srgbClr val="FFFF00"/>
+                </a:highlight>
+                <a:latin typeface="Consolas" panose="020B0609020204030204" pitchFamily="49" charset="0"/>
+              </a:rPr>
+              <a:t>(Stav stav)</a:t>
+            </a:r>
+            <a:r>
+              <a:rPr lang="sk-SK" sz="2400" dirty="0"/>
+              <a:t> - do samostatného riadku vypíše "Slovo: " a za ním vypíše zatiaľ uhádnuté slovo </a:t>
+            </a:r>
+            <a:r>
+              <a:rPr lang="sk-SK" sz="2400" dirty="0" err="1">
+                <a:highlight>
+                  <a:srgbClr val="FFFF00"/>
+                </a:highlight>
+                <a:latin typeface="Consolas" panose="020B0609020204030204" pitchFamily="49" charset="0"/>
+              </a:rPr>
+              <a:t>stav.getSlovo</a:t>
+            </a:r>
+            <a:r>
+              <a:rPr lang="sk-SK" sz="2400" dirty="0">
+                <a:highlight>
+                  <a:srgbClr val="FFFF00"/>
+                </a:highlight>
+                <a:latin typeface="Consolas" panose="020B0609020204030204" pitchFamily="49" charset="0"/>
+              </a:rPr>
+              <a:t>()</a:t>
             </a:r>
           </a:p>
           <a:p>
             <a:pPr marL="514350" indent="-514350">
+              <a:lnSpc>
+                <a:spcPct val="100000"/>
+              </a:lnSpc>
+              <a:spcBef>
+                <a:spcPts val="0"/>
+              </a:spcBef>
               <a:buFont typeface="+mj-lt"/>
               <a:buAutoNum type="arabicPeriod"/>
             </a:pPr>
             <a:r>
-              <a:rPr lang="sk-SK" dirty="0"/>
-              <a:t>Do triedy </a:t>
-            </a:r>
-            <a:r>
-              <a:rPr lang="sk-SK" dirty="0">
-                <a:highlight>
-                  <a:srgbClr val="FFFF00"/>
-                </a:highlight>
-                <a:latin typeface="Consolas" panose="020B0609020204030204" pitchFamily="49" charset="0"/>
-              </a:rPr>
-              <a:t>Hra</a:t>
-            </a:r>
-            <a:r>
-              <a:rPr lang="sk-SK" dirty="0"/>
-              <a:t> pridajte statickú metódu </a:t>
-            </a:r>
-            <a:r>
-              <a:rPr lang="sk-SK" dirty="0" err="1">
-                <a:highlight>
-                  <a:srgbClr val="FFFF00"/>
-                </a:highlight>
-                <a:latin typeface="Consolas" panose="020B0609020204030204" pitchFamily="49" charset="0"/>
-              </a:rPr>
-              <a:t>getSlovnikCustom</a:t>
-            </a:r>
-            <a:r>
-              <a:rPr lang="sk-SK" dirty="0">
+              <a:rPr lang="sk-SK" sz="2400" dirty="0" err="1">
+                <a:highlight>
+                  <a:srgbClr val="FFFF00"/>
+                </a:highlight>
+                <a:latin typeface="Consolas" panose="020B0609020204030204" pitchFamily="49" charset="0"/>
+              </a:rPr>
+              <a:t>public</a:t>
+            </a:r>
+            <a:r>
+              <a:rPr lang="sk-SK" sz="2400" dirty="0">
+                <a:highlight>
+                  <a:srgbClr val="FFFF00"/>
+                </a:highlight>
+                <a:latin typeface="Consolas" panose="020B0609020204030204" pitchFamily="49" charset="0"/>
+              </a:rPr>
+              <a:t> </a:t>
+            </a:r>
+            <a:r>
+              <a:rPr lang="sk-SK" sz="2400" dirty="0" err="1">
+                <a:highlight>
+                  <a:srgbClr val="FFFF00"/>
+                </a:highlight>
+                <a:latin typeface="Consolas" panose="020B0609020204030204" pitchFamily="49" charset="0"/>
+              </a:rPr>
+              <a:t>void</a:t>
+            </a:r>
+            <a:r>
+              <a:rPr lang="sk-SK" sz="2400" dirty="0">
+                <a:highlight>
+                  <a:srgbClr val="FFFF00"/>
+                </a:highlight>
+                <a:latin typeface="Consolas" panose="020B0609020204030204" pitchFamily="49" charset="0"/>
+              </a:rPr>
+              <a:t> </a:t>
+            </a:r>
+            <a:r>
+              <a:rPr lang="sk-SK" sz="2400" dirty="0" err="1">
+                <a:highlight>
+                  <a:srgbClr val="FFFF00"/>
+                </a:highlight>
+                <a:latin typeface="Consolas" panose="020B0609020204030204" pitchFamily="49" charset="0"/>
+              </a:rPr>
+              <a:t>vypisVysledokHry</a:t>
+            </a:r>
+            <a:r>
+              <a:rPr lang="sk-SK" sz="2400" dirty="0">
+                <a:highlight>
+                  <a:srgbClr val="FFFF00"/>
+                </a:highlight>
+                <a:latin typeface="Consolas" panose="020B0609020204030204" pitchFamily="49" charset="0"/>
+              </a:rPr>
+              <a:t>(Stav stav)</a:t>
+            </a:r>
+            <a:r>
+              <a:rPr lang="sk-SK" sz="2400" dirty="0"/>
+              <a:t> - Ak je </a:t>
+            </a:r>
+            <a:r>
+              <a:rPr lang="sk-SK" sz="2400" dirty="0" err="1">
+                <a:highlight>
+                  <a:srgbClr val="FFFF00"/>
+                </a:highlight>
+                <a:latin typeface="Consolas" panose="020B0609020204030204" pitchFamily="49" charset="0"/>
+              </a:rPr>
+              <a:t>stav.isVyhra</a:t>
+            </a:r>
+            <a:r>
+              <a:rPr lang="sk-SK" sz="2400" dirty="0">
                 <a:highlight>
                   <a:srgbClr val="FFFF00"/>
                 </a:highlight>
@@ -4025,48 +4262,197 @@
               <a:t>()</a:t>
             </a:r>
             <a:r>
-              <a:rPr lang="sk-SK" dirty="0"/>
-              <a:t>, ktorá vráti nový ručne zadaný slovník</a:t>
+              <a:rPr lang="sk-SK" sz="2400" dirty="0"/>
+              <a:t> </a:t>
+            </a:r>
+            <a:r>
+              <a:rPr lang="sk-SK" sz="2400" dirty="0" err="1">
+                <a:highlight>
+                  <a:srgbClr val="FFFF00"/>
+                </a:highlight>
+                <a:latin typeface="Consolas" panose="020B0609020204030204" pitchFamily="49" charset="0"/>
+              </a:rPr>
+              <a:t>true</a:t>
+            </a:r>
+            <a:r>
+              <a:rPr lang="sk-SK" sz="2400" dirty="0"/>
+              <a:t>, vypíše "Vyhral si!". V opačnom prípade vypíše "Prehral si, hľadané slovo bolo: " a vypíše hľadané slovo.</a:t>
             </a:r>
           </a:p>
           <a:p>
             <a:pPr marL="514350" indent="-514350">
+              <a:lnSpc>
+                <a:spcPct val="100000"/>
+              </a:lnSpc>
+              <a:spcBef>
+                <a:spcPts val="0"/>
+              </a:spcBef>
               <a:buFont typeface="+mj-lt"/>
               <a:buAutoNum type="arabicPeriod"/>
             </a:pPr>
             <a:r>
-              <a:rPr lang="sk-SK" dirty="0"/>
-              <a:t>Upravte metódu </a:t>
-            </a:r>
-            <a:r>
-              <a:rPr lang="sk-SK" dirty="0" err="1">
-                <a:highlight>
-                  <a:srgbClr val="FFFF00"/>
-                </a:highlight>
-                <a:latin typeface="Consolas" panose="020B0609020204030204" pitchFamily="49" charset="0"/>
-              </a:rPr>
-              <a:t>novaTextovaHra</a:t>
-            </a:r>
-            <a:r>
-              <a:rPr lang="sk-SK" dirty="0">
-                <a:highlight>
-                  <a:srgbClr val="FFFF00"/>
-                </a:highlight>
-                <a:latin typeface="Consolas" panose="020B0609020204030204" pitchFamily="49" charset="0"/>
-              </a:rPr>
-              <a:t>()</a:t>
-            </a:r>
-            <a:r>
-              <a:rPr lang="sk-SK" dirty="0"/>
-              <a:t> tak, aby sa použil tento slovník</a:t>
-            </a:r>
-          </a:p>
-          <a:p>
-            <a:pPr marL="514350" indent="-514350">
-              <a:buFont typeface="+mj-lt"/>
-              <a:buAutoNum type="arabicPeriod"/>
-            </a:pPr>
-            <a:endParaRPr lang="sk-SK" dirty="0"/>
+              <a:rPr lang="sk-SK" sz="2400" dirty="0" err="1">
+                <a:highlight>
+                  <a:srgbClr val="FFFF00"/>
+                </a:highlight>
+                <a:latin typeface="Consolas" panose="020B0609020204030204" pitchFamily="49" charset="0"/>
+              </a:rPr>
+              <a:t>public</a:t>
+            </a:r>
+            <a:r>
+              <a:rPr lang="sk-SK" sz="2400" dirty="0">
+                <a:highlight>
+                  <a:srgbClr val="FFFF00"/>
+                </a:highlight>
+                <a:latin typeface="Consolas" panose="020B0609020204030204" pitchFamily="49" charset="0"/>
+              </a:rPr>
+              <a:t> </a:t>
+            </a:r>
+            <a:r>
+              <a:rPr lang="sk-SK" sz="2400" dirty="0" err="1">
+                <a:highlight>
+                  <a:srgbClr val="FFFF00"/>
+                </a:highlight>
+                <a:latin typeface="Consolas" panose="020B0609020204030204" pitchFamily="49" charset="0"/>
+              </a:rPr>
+              <a:t>void</a:t>
+            </a:r>
+            <a:r>
+              <a:rPr lang="sk-SK" sz="2400" dirty="0">
+                <a:highlight>
+                  <a:srgbClr val="FFFF00"/>
+                </a:highlight>
+                <a:latin typeface="Consolas" panose="020B0609020204030204" pitchFamily="49" charset="0"/>
+              </a:rPr>
+              <a:t> </a:t>
+            </a:r>
+            <a:r>
+              <a:rPr lang="sk-SK" sz="2400" dirty="0" err="1">
+                <a:highlight>
+                  <a:srgbClr val="FFFF00"/>
+                </a:highlight>
+                <a:latin typeface="Consolas" panose="020B0609020204030204" pitchFamily="49" charset="0"/>
+              </a:rPr>
+              <a:t>vypisVysledokHadania</a:t>
+            </a:r>
+            <a:r>
+              <a:rPr lang="sk-SK" sz="2400" dirty="0">
+                <a:highlight>
+                  <a:srgbClr val="FFFF00"/>
+                </a:highlight>
+                <a:latin typeface="Consolas" panose="020B0609020204030204" pitchFamily="49" charset="0"/>
+              </a:rPr>
+              <a:t>(</a:t>
+            </a:r>
+            <a:r>
+              <a:rPr lang="sk-SK" sz="2400" dirty="0" err="1">
+                <a:highlight>
+                  <a:srgbClr val="FFFF00"/>
+                </a:highlight>
+                <a:latin typeface="Consolas" panose="020B0609020204030204" pitchFamily="49" charset="0"/>
+              </a:rPr>
+              <a:t>char</a:t>
+            </a:r>
+            <a:r>
+              <a:rPr lang="sk-SK" sz="2400" dirty="0">
+                <a:highlight>
+                  <a:srgbClr val="FFFF00"/>
+                </a:highlight>
+                <a:latin typeface="Consolas" panose="020B0609020204030204" pitchFamily="49" charset="0"/>
+              </a:rPr>
+              <a:t> tip, boolean </a:t>
+            </a:r>
+            <a:r>
+              <a:rPr lang="sk-SK" sz="2400" dirty="0" err="1">
+                <a:highlight>
+                  <a:srgbClr val="FFFF00"/>
+                </a:highlight>
+                <a:latin typeface="Consolas" panose="020B0609020204030204" pitchFamily="49" charset="0"/>
+              </a:rPr>
+              <a:t>spravnyTip</a:t>
+            </a:r>
+            <a:r>
+              <a:rPr lang="sk-SK" sz="2400" dirty="0">
+                <a:highlight>
+                  <a:srgbClr val="FFFF00"/>
+                </a:highlight>
+                <a:latin typeface="Consolas" panose="020B0609020204030204" pitchFamily="49" charset="0"/>
+              </a:rPr>
+              <a:t>)</a:t>
+            </a:r>
+            <a:r>
+              <a:rPr lang="sk-SK" sz="2400" dirty="0"/>
+              <a:t> - ak je </a:t>
+            </a:r>
+            <a:r>
+              <a:rPr lang="sk-SK" sz="2400" dirty="0" err="1"/>
+              <a:t>vstupny</a:t>
+            </a:r>
+            <a:r>
+              <a:rPr lang="sk-SK" sz="2400" dirty="0"/>
+              <a:t> argument </a:t>
+            </a:r>
+            <a:r>
+              <a:rPr lang="sk-SK" sz="2400" dirty="0" err="1">
+                <a:highlight>
+                  <a:srgbClr val="FFFF00"/>
+                </a:highlight>
+                <a:latin typeface="Consolas" panose="020B0609020204030204" pitchFamily="49" charset="0"/>
+              </a:rPr>
+              <a:t>spravnyTip</a:t>
+            </a:r>
+            <a:r>
+              <a:rPr lang="sk-SK" sz="2400" dirty="0"/>
+              <a:t> </a:t>
+            </a:r>
+            <a:r>
+              <a:rPr lang="sk-SK" sz="2400" dirty="0" err="1">
+                <a:highlight>
+                  <a:srgbClr val="FFFF00"/>
+                </a:highlight>
+                <a:latin typeface="Consolas" panose="020B0609020204030204" pitchFamily="49" charset="0"/>
+              </a:rPr>
+              <a:t>true</a:t>
+            </a:r>
+            <a:r>
+              <a:rPr lang="sk-SK" sz="2400" dirty="0"/>
+              <a:t>, vypíše "</a:t>
+            </a:r>
+            <a:r>
+              <a:rPr lang="sk-SK" sz="2400" dirty="0" err="1"/>
+              <a:t>Uhadol</a:t>
+            </a:r>
+            <a:r>
+              <a:rPr lang="sk-SK" sz="2400" dirty="0"/>
+              <a:t> si </a:t>
+            </a:r>
+            <a:r>
+              <a:rPr lang="sk-SK" sz="2400" dirty="0" err="1"/>
+              <a:t>dalsi</a:t>
+            </a:r>
+            <a:r>
+              <a:rPr lang="sk-SK" sz="2400" dirty="0"/>
+              <a:t> znak!". V opačnom prípade vypíše "Znak %c sa v hľadanom slove nenachádza", pričom vypíše znak </a:t>
+            </a:r>
+            <a:r>
+              <a:rPr lang="sk-SK" sz="2400" dirty="0">
+                <a:highlight>
+                  <a:srgbClr val="FFFF00"/>
+                </a:highlight>
+                <a:latin typeface="Consolas" panose="020B0609020204030204" pitchFamily="49" charset="0"/>
+              </a:rPr>
+              <a:t>tip</a:t>
+            </a:r>
+            <a:r>
+              <a:rPr lang="sk-SK" sz="2400" dirty="0"/>
+              <a:t>.</a:t>
+            </a:r>
+            <a:endParaRPr lang="sk-SK" sz="2400" dirty="0">
+              <a:highlight>
+                <a:srgbClr val="FFFF00"/>
+              </a:highlight>
+              <a:latin typeface="Consolas" panose="020B0609020204030204" pitchFamily="49" charset="0"/>
+            </a:endParaRPr>
           </a:p>
         </p:txBody>
       </p:sp>
@@ -4075,7 +4461,7 @@
           <p:cNvPr id="5" name="Nadpis 4">
             <a:extLst>
               <a:ext uri="{FF2B5EF4-FFF2-40B4-BE49-F238E27FC236}">
-                <a16:creationId xmlns:a16="http://schemas.microsoft.com/office/drawing/2014/main" id="{DF943F94-F507-405B-134D-FD3CA6CDD9C1}"/>
+                <a16:creationId xmlns:a16="http://schemas.microsoft.com/office/drawing/2014/main" id="{5E5AECCF-0947-75A0-71E0-595035D08BF4}"/>
               </a:ext>
             </a:extLst>
           </p:cNvPr>
@@ -4095,7 +4481,7 @@
           <a:p>
             <a:r>
               <a:rPr lang="sk-SK" dirty="0"/>
-              <a:t>Úloha 8.9: Slovník zadaný z klávesnice</a:t>
+              <a:t>Úloha 7.7: Vypísanie informácii</a:t>
             </a:r>
           </a:p>
         </p:txBody>
@@ -4103,7 +4489,7 @@
     </p:spTree>
     <p:extLst>
       <p:ext uri="{BB962C8B-B14F-4D97-AF65-F5344CB8AC3E}">
-        <p14:creationId xmlns:p14="http://schemas.microsoft.com/office/powerpoint/2010/main" val="2601947843"/>
+        <p14:creationId xmlns:p14="http://schemas.microsoft.com/office/powerpoint/2010/main" val="2468211341"/>
       </p:ext>
     </p:extLst>
   </p:cSld>
@@ -4129,7 +4515,7 @@
         <p:cNvPr id="1" name="">
           <a:extLst>
             <a:ext uri="{FF2B5EF4-FFF2-40B4-BE49-F238E27FC236}">
-              <a16:creationId xmlns:a16="http://schemas.microsoft.com/office/drawing/2014/main" id="{D0E6B377-E626-B895-3D06-92ED6CD8FEDE}"/>
+              <a16:creationId xmlns:a16="http://schemas.microsoft.com/office/drawing/2014/main" id="{83724E73-2506-0716-9CF0-303B55A46B67}"/>
             </a:ext>
           </a:extLst>
         </p:cNvPr>
@@ -4149,7 +4535,7 @@
           <p:cNvPr id="4" name="Zástupný objekt pre obsah 3">
             <a:extLst>
               <a:ext uri="{FF2B5EF4-FFF2-40B4-BE49-F238E27FC236}">
-                <a16:creationId xmlns:a16="http://schemas.microsoft.com/office/drawing/2014/main" id="{219B178E-839A-44C6-C360-F258E0076816}"/>
+                <a16:creationId xmlns:a16="http://schemas.microsoft.com/office/drawing/2014/main" id="{B0F576FB-A56F-824F-2D49-3DFAA36B49D9}"/>
               </a:ext>
             </a:extLst>
           </p:cNvPr>
@@ -4174,7 +4560,7 @@
           <p:cNvPr id="7" name="Nadpis 6">
             <a:extLst>
               <a:ext uri="{FF2B5EF4-FFF2-40B4-BE49-F238E27FC236}">
-                <a16:creationId xmlns:a16="http://schemas.microsoft.com/office/drawing/2014/main" id="{0D76DB23-BE47-3DA2-4FEA-3F6222418B93}"/>
+                <a16:creationId xmlns:a16="http://schemas.microsoft.com/office/drawing/2014/main" id="{FD3AB515-C70F-B9FA-A156-A47494A74B11}"/>
               </a:ext>
             </a:extLst>
           </p:cNvPr>
@@ -4196,10 +4582,10 @@
       </p:sp>
       <p:pic>
         <p:nvPicPr>
-          <p:cNvPr id="9" name="Obrázok 8">
+          <p:cNvPr id="3" name="Obrázok 2">
             <a:extLst>
               <a:ext uri="{FF2B5EF4-FFF2-40B4-BE49-F238E27FC236}">
-                <a16:creationId xmlns:a16="http://schemas.microsoft.com/office/drawing/2014/main" id="{3D082F33-BE4F-FF2A-F268-B0D1466FE03D}"/>
+                <a16:creationId xmlns:a16="http://schemas.microsoft.com/office/drawing/2014/main" id="{D8DD5F89-1101-C27F-B611-024A780B75C5}"/>
               </a:ext>
             </a:extLst>
           </p:cNvPr>
@@ -4216,8 +4602,8 @@
         </p:blipFill>
         <p:spPr>
           <a:xfrm>
-            <a:off x="3248226" y="558419"/>
-            <a:ext cx="5071843" cy="5934456"/>
+            <a:off x="1811860" y="642166"/>
+            <a:ext cx="7983064" cy="5534797"/>
           </a:xfrm>
           <a:prstGeom prst="rect">
             <a:avLst/>
@@ -4227,7 +4613,193 @@
     </p:spTree>
     <p:extLst>
       <p:ext uri="{BB962C8B-B14F-4D97-AF65-F5344CB8AC3E}">
-        <p14:creationId xmlns:p14="http://schemas.microsoft.com/office/powerpoint/2010/main" val="1335605969"/>
+        <p14:creationId xmlns:p14="http://schemas.microsoft.com/office/powerpoint/2010/main" val="960875029"/>
+      </p:ext>
+    </p:extLst>
+  </p:cSld>
+  <p:clrMapOvr>
+    <a:masterClrMapping/>
+  </p:clrMapOvr>
+</p:sld>
+</file>
+
+<file path=ppt/slides/slide13.xml><?xml version="1.0" encoding="utf-8"?>
+<p:sld xmlns:a="http://schemas.openxmlformats.org/drawingml/2006/main" xmlns:r="http://schemas.openxmlformats.org/officeDocument/2006/relationships" xmlns:p="http://schemas.openxmlformats.org/presentationml/2006/main">
+  <p:cSld>
+    <p:bg>
+      <p:bgPr>
+        <a:solidFill>
+          <a:schemeClr val="bg1"/>
+        </a:solidFill>
+        <a:effectLst/>
+      </p:bgPr>
+    </p:bg>
+    <p:spTree>
+      <p:nvGrpSpPr>
+        <p:cNvPr id="1" name="">
+          <a:extLst>
+            <a:ext uri="{FF2B5EF4-FFF2-40B4-BE49-F238E27FC236}">
+              <a16:creationId xmlns:a16="http://schemas.microsoft.com/office/drawing/2014/main" id="{F2953A15-AF1B-F9EF-E254-9375F15B55D5}"/>
+            </a:ext>
+          </a:extLst>
+        </p:cNvPr>
+        <p:cNvGrpSpPr/>
+        <p:nvPr/>
+      </p:nvGrpSpPr>
+      <p:grpSpPr>
+        <a:xfrm>
+          <a:off x="0" y="0"/>
+          <a:ext cx="0" cy="0"/>
+          <a:chOff x="0" y="0"/>
+          <a:chExt cx="0" cy="0"/>
+        </a:xfrm>
+      </p:grpSpPr>
+      <p:sp>
+        <p:nvSpPr>
+          <p:cNvPr id="3" name="Zástupný objekt pre obsah 2">
+            <a:extLst>
+              <a:ext uri="{FF2B5EF4-FFF2-40B4-BE49-F238E27FC236}">
+                <a16:creationId xmlns:a16="http://schemas.microsoft.com/office/drawing/2014/main" id="{B4E63D8E-8726-2782-482B-24B7E55CAAE2}"/>
+              </a:ext>
+            </a:extLst>
+          </p:cNvPr>
+          <p:cNvSpPr>
+            <a:spLocks noGrp="1"/>
+          </p:cNvSpPr>
+          <p:nvPr>
+            <p:ph idx="1"/>
+          </p:nvPr>
+        </p:nvSpPr>
+        <p:spPr>
+          <a:xfrm>
+            <a:off x="274320" y="1516550"/>
+            <a:ext cx="11759184" cy="4847673"/>
+          </a:xfrm>
+        </p:spPr>
+        <p:txBody>
+          <a:bodyPr>
+            <a:noAutofit/>
+          </a:bodyPr>
+          <a:lstStyle/>
+          <a:p>
+            <a:pPr marL="0" indent="0">
+              <a:lnSpc>
+                <a:spcPct val="100000"/>
+              </a:lnSpc>
+              <a:spcBef>
+                <a:spcPts val="0"/>
+              </a:spcBef>
+              <a:buNone/>
+            </a:pPr>
+            <a:r>
+              <a:rPr lang="sk-SK" dirty="0"/>
+              <a:t>Vytvorte triedu </a:t>
+            </a:r>
+            <a:r>
+              <a:rPr lang="sk-SK" dirty="0" err="1">
+                <a:highlight>
+                  <a:srgbClr val="FFFF00"/>
+                </a:highlight>
+                <a:latin typeface="Consolas" panose="020B0609020204030204" pitchFamily="49" charset="0"/>
+              </a:rPr>
+              <a:t>sk.spse.hangman.Hra</a:t>
+            </a:r>
+            <a:r>
+              <a:rPr lang="sk-SK" dirty="0"/>
+              <a:t> s kódom podľa učebnice</a:t>
+            </a:r>
+          </a:p>
+          <a:p>
+            <a:pPr marL="0" indent="0">
+              <a:lnSpc>
+                <a:spcPct val="100000"/>
+              </a:lnSpc>
+              <a:spcBef>
+                <a:spcPts val="0"/>
+              </a:spcBef>
+              <a:buNone/>
+            </a:pPr>
+            <a:endParaRPr lang="sk-SK" dirty="0"/>
+          </a:p>
+          <a:p>
+            <a:pPr marL="0" indent="0">
+              <a:lnSpc>
+                <a:spcPct val="100000"/>
+              </a:lnSpc>
+              <a:spcBef>
+                <a:spcPts val="0"/>
+              </a:spcBef>
+              <a:buNone/>
+            </a:pPr>
+            <a:endParaRPr lang="sk-SK" dirty="0"/>
+          </a:p>
+        </p:txBody>
+      </p:sp>
+      <p:sp>
+        <p:nvSpPr>
+          <p:cNvPr id="5" name="Nadpis 4">
+            <a:extLst>
+              <a:ext uri="{FF2B5EF4-FFF2-40B4-BE49-F238E27FC236}">
+                <a16:creationId xmlns:a16="http://schemas.microsoft.com/office/drawing/2014/main" id="{CDC02E39-5DA6-F4BC-7BF0-66A6D37DF7C5}"/>
+              </a:ext>
+            </a:extLst>
+          </p:cNvPr>
+          <p:cNvSpPr>
+            <a:spLocks noGrp="1"/>
+          </p:cNvSpPr>
+          <p:nvPr>
+            <p:ph type="title"/>
+          </p:nvPr>
+        </p:nvSpPr>
+        <p:spPr/>
+        <p:txBody>
+          <a:bodyPr>
+            <a:normAutofit/>
+          </a:bodyPr>
+          <a:lstStyle/>
+          <a:p>
+            <a:r>
+              <a:rPr lang="es-ES" dirty="0"/>
+              <a:t>Úloha 7.8: Hlavná trieda Hra</a:t>
+            </a:r>
+            <a:endParaRPr lang="sk-SK" dirty="0"/>
+          </a:p>
+        </p:txBody>
+      </p:sp>
+      <p:pic>
+        <p:nvPicPr>
+          <p:cNvPr id="4" name="Obrázok 3">
+            <a:extLst>
+              <a:ext uri="{FF2B5EF4-FFF2-40B4-BE49-F238E27FC236}">
+                <a16:creationId xmlns:a16="http://schemas.microsoft.com/office/drawing/2014/main" id="{7F8D43B9-D2C2-A134-F4A8-5043909C26B6}"/>
+              </a:ext>
+            </a:extLst>
+          </p:cNvPr>
+          <p:cNvPicPr>
+            <a:picLocks noChangeAspect="1"/>
+          </p:cNvPicPr>
+          <p:nvPr/>
+        </p:nvPicPr>
+        <p:blipFill>
+          <a:blip r:embed="rId2"/>
+          <a:stretch>
+            <a:fillRect/>
+          </a:stretch>
+        </p:blipFill>
+        <p:spPr>
+          <a:xfrm>
+            <a:off x="3452682" y="2578767"/>
+            <a:ext cx="4591691" cy="3181794"/>
+          </a:xfrm>
+          <a:prstGeom prst="rect">
+            <a:avLst/>
+          </a:prstGeom>
+        </p:spPr>
+      </p:pic>
+    </p:spTree>
+    <p:extLst>
+      <p:ext uri="{BB962C8B-B14F-4D97-AF65-F5344CB8AC3E}">
+        <p14:creationId xmlns:p14="http://schemas.microsoft.com/office/powerpoint/2010/main" val="3500114264"/>
       </p:ext>
     </p:extLst>
   </p:cSld>
@@ -4680,7 +5252,7 @@
             </a:r>
             <a:r>
               <a:rPr lang="en-US" sz="4000" dirty="0"/>
-              <a:t>8</a:t>
+              <a:t>7</a:t>
             </a:r>
             <a:endParaRPr lang="sk-SK" sz="4000" dirty="0"/>
           </a:p>
@@ -4775,15 +5347,7 @@
             </a:pPr>
             <a:r>
               <a:rPr lang="en-US" dirty="0" err="1"/>
-              <a:t>Slovník</a:t>
-            </a:r>
-            <a:r>
-              <a:rPr lang="en-US" dirty="0"/>
-              <a:t> do </a:t>
-            </a:r>
-            <a:r>
-              <a:rPr lang="en-US" dirty="0" err="1"/>
-              <a:t>hry</a:t>
+              <a:t>Hra</a:t>
             </a:r>
             <a:r>
               <a:rPr lang="en-US" dirty="0"/>
@@ -4797,17 +5361,12 @@
             </a:pPr>
             <a:r>
               <a:rPr lang="en-US" dirty="0" err="1"/>
-              <a:t>Slovník</a:t>
+              <a:t>Trieda</a:t>
             </a:r>
             <a:r>
               <a:rPr lang="en-US" dirty="0"/>
-              <a:t> v </a:t>
-            </a:r>
-            <a:r>
-              <a:rPr lang="en-US" dirty="0" err="1"/>
-              <a:t>kóde</a:t>
-            </a:r>
-            <a:endParaRPr lang="en-US" dirty="0"/>
+              <a:t> Stav</a:t>
+            </a:r>
           </a:p>
           <a:p>
             <a:pPr marL="514350" indent="-514350">
@@ -4816,23 +5375,15 @@
             </a:pPr>
             <a:r>
               <a:rPr lang="en-US" dirty="0" err="1"/>
-              <a:t>Slovník</a:t>
+              <a:t>Trieda</a:t>
             </a:r>
             <a:r>
               <a:rPr lang="en-US" dirty="0"/>
-              <a:t> zo </a:t>
+              <a:t> </a:t>
             </a:r>
             <a:r>
               <a:rPr lang="en-US" dirty="0" err="1"/>
-              <a:t>súboru</a:t>
-            </a:r>
-            <a:r>
-              <a:rPr lang="en-US" dirty="0"/>
-              <a:t> a z </a:t>
-            </a:r>
-            <a:r>
-              <a:rPr lang="en-US" dirty="0" err="1"/>
-              <a:t>internetu</a:t>
+              <a:t>TextoveUI</a:t>
             </a:r>
             <a:endParaRPr lang="en-US" dirty="0"/>
           </a:p>
@@ -4843,15 +5394,15 @@
             </a:pPr>
             <a:r>
               <a:rPr lang="en-US" dirty="0" err="1"/>
-              <a:t>Slovník</a:t>
+              <a:t>Trieda</a:t>
             </a:r>
             <a:r>
               <a:rPr lang="en-US" dirty="0"/>
-              <a:t> z </a:t>
+              <a:t> </a:t>
             </a:r>
             <a:r>
               <a:rPr lang="en-US" dirty="0" err="1"/>
-              <a:t>klávesnice</a:t>
+              <a:t>Hra</a:t>
             </a:r>
             <a:endParaRPr lang="sk-SK" dirty="0"/>
           </a:p>
@@ -4919,8 +5470,8 @@
         </p:nvSpPr>
         <p:spPr>
           <a:xfrm>
-            <a:off x="1144743" y="1571414"/>
-            <a:ext cx="8566186" cy="4729437"/>
+            <a:off x="1144742" y="1571414"/>
+            <a:ext cx="10422417" cy="4729437"/>
           </a:xfrm>
         </p:spPr>
         <p:txBody>
@@ -4948,7 +5499,7 @@
             </a:pPr>
             <a:r>
               <a:rPr lang="sk-SK" sz="2800" dirty="0"/>
-              <a:t>Namiesto načítania hádaného slova z klávesnice hra bude mať zoznam slov</a:t>
+              <a:t>Hra obesenec v príkazovom riadku</a:t>
             </a:r>
           </a:p>
           <a:p>
@@ -4959,7 +5510,7 @@
             </a:pPr>
             <a:r>
               <a:rPr lang="sk-SK" sz="2800" dirty="0"/>
-              <a:t>Z tohto zoznamu slov hra na začiatku náhodne vyberie hádané slovo</a:t>
+              <a:t>Na začiatku hra požiada o slovo, ktoré sa bude hádať</a:t>
             </a:r>
           </a:p>
           <a:p>
@@ -4970,7 +5521,18 @@
             </a:pPr>
             <a:r>
               <a:rPr lang="sk-SK" sz="2800" dirty="0"/>
-              <a:t>Vyskúšame si rôzne spôsoby vytvárania slovníka</a:t>
+              <a:t>Hráč zadá písmeno, hra ukáže uhádnuté znaky v slove</a:t>
+            </a:r>
+          </a:p>
+          <a:p>
+            <a:pPr lvl="1">
+              <a:spcBef>
+                <a:spcPts val="1200"/>
+              </a:spcBef>
+            </a:pPr>
+            <a:r>
+              <a:rPr lang="sk-SK" sz="2800" dirty="0"/>
+              <a:t>Hráč má 5 pokusov, potom hra končí</a:t>
             </a:r>
             <a:endParaRPr lang="sk-SK" sz="2800" dirty="0">
               <a:highlight>
@@ -5003,12 +5565,12 @@
           <a:lstStyle/>
           <a:p>
             <a:r>
-              <a:rPr lang="sk-SK" dirty="0"/>
-              <a:t>Slovník do hry </a:t>
-            </a:r>
-            <a:r>
-              <a:rPr lang="sk-SK" dirty="0" err="1"/>
-              <a:t>Hangman</a:t>
+              <a:rPr lang="en-US" dirty="0"/>
+              <a:t>Hangman - </a:t>
+            </a:r>
+            <a:r>
+              <a:rPr lang="en-US" dirty="0" err="1"/>
+              <a:t>obesenec</a:t>
             </a:r>
             <a:endParaRPr lang="sk-SK" dirty="0"/>
           </a:p>
@@ -5105,20 +5667,7 @@
             </a:pPr>
             <a:r>
               <a:rPr lang="sk-SK" sz="2800" dirty="0"/>
-              <a:t>Nová trieda </a:t>
-            </a:r>
-            <a:r>
-              <a:rPr lang="sk-SK" sz="2800" dirty="0" err="1">
-                <a:highlight>
-                  <a:srgbClr val="FFFF00"/>
-                </a:highlight>
-                <a:latin typeface="Consolas" panose="020B0609020204030204" pitchFamily="49" charset="0"/>
-              </a:rPr>
-              <a:t>Slovnik</a:t>
-            </a:r>
-            <a:r>
-              <a:rPr lang="sk-SK" sz="2800" dirty="0"/>
-              <a:t>, ktorá bude spravovať zoznam slov</a:t>
+              <a:t>Vytvoríme 3 triedy</a:t>
             </a:r>
           </a:p>
           <a:p>
@@ -5129,20 +5678,20 @@
             </a:pPr>
             <a:r>
               <a:rPr lang="sk-SK" sz="2800" dirty="0"/>
-              <a:t>Úprava triedy </a:t>
-            </a:r>
-            <a:r>
-              <a:rPr lang="sk-SK" sz="2800" dirty="0" err="1">
-                <a:highlight>
-                  <a:srgbClr val="FFFF00"/>
-                </a:highlight>
-                <a:latin typeface="Consolas" panose="020B0609020204030204" pitchFamily="49" charset="0"/>
-              </a:rPr>
-              <a:t>TextoveUI</a:t>
+              <a:t>Trieda </a:t>
+            </a:r>
+            <a:r>
+              <a:rPr lang="sk-SK" sz="2800" dirty="0">
+                <a:highlight>
+                  <a:srgbClr val="FFFF00"/>
+                </a:highlight>
+                <a:latin typeface="Consolas" panose="020B0609020204030204" pitchFamily="49" charset="0"/>
+              </a:rPr>
+              <a:t>Stav</a:t>
             </a:r>
             <a:r>
               <a:rPr lang="sk-SK" sz="2800" dirty="0"/>
-              <a:t> o pomocné metódy slovníka</a:t>
+              <a:t> bude spravovať stav hry: hádané slovo, uhádnuté znaky a počet ostávajúcich pokusov</a:t>
             </a:r>
           </a:p>
           <a:p>
@@ -5153,20 +5702,20 @@
             </a:pPr>
             <a:r>
               <a:rPr lang="sk-SK" sz="2800" dirty="0"/>
-              <a:t>Úprava triedy </a:t>
-            </a:r>
-            <a:r>
-              <a:rPr lang="sk-SK" sz="2800" dirty="0">
-                <a:highlight>
-                  <a:srgbClr val="FFFF00"/>
-                </a:highlight>
-                <a:latin typeface="Consolas" panose="020B0609020204030204" pitchFamily="49" charset="0"/>
-              </a:rPr>
-              <a:t>Stav</a:t>
+              <a:t>Trieda </a:t>
+            </a:r>
+            <a:r>
+              <a:rPr lang="sk-SK" sz="2800" dirty="0" err="1">
+                <a:highlight>
+                  <a:srgbClr val="FFFF00"/>
+                </a:highlight>
+                <a:latin typeface="Consolas" panose="020B0609020204030204" pitchFamily="49" charset="0"/>
+              </a:rPr>
+              <a:t>TextoveUI</a:t>
             </a:r>
             <a:r>
               <a:rPr lang="sk-SK" sz="2800" dirty="0"/>
-              <a:t> tak, aby v konštruktore prijímala namiesto hádaného slova slovník slov</a:t>
+              <a:t> bude mať na starosť užívateľské rozhranie: výpis na obrazovku a načítavanie z klávesnice</a:t>
             </a:r>
           </a:p>
           <a:p>
@@ -5177,7 +5726,7 @@
             </a:pPr>
             <a:r>
               <a:rPr lang="sk-SK" sz="2800" dirty="0"/>
-              <a:t>Úprava triedy </a:t>
+              <a:t>Trieda </a:t>
             </a:r>
             <a:r>
               <a:rPr lang="sk-SK" sz="2800" dirty="0">
@@ -5190,7 +5739,19 @@
             </a:r>
             <a:r>
               <a:rPr lang="sk-SK" sz="2800" dirty="0"/>
-              <a:t> tak, aby namiesto získania hádaného slova vytvorila a použila slovník</a:t>
+              <a:t> bude mať </a:t>
+            </a:r>
+            <a:r>
+              <a:rPr lang="sk-SK" sz="2800" dirty="0" err="1"/>
+              <a:t>hlav</a:t>
+            </a:r>
+            <a:r>
+              <a:rPr lang="en-US" sz="2800" dirty="0"/>
+              <a:t>n</a:t>
+            </a:r>
+            <a:r>
+              <a:rPr lang="sk-SK" sz="2800" dirty="0"/>
+              <a:t>ú logiku hry a vstupný bod programu</a:t>
             </a:r>
             <a:endParaRPr lang="sk-SK" sz="2800" dirty="0">
               <a:highlight>
@@ -5223,12 +5784,12 @@
           <a:lstStyle/>
           <a:p>
             <a:r>
-              <a:rPr lang="sk-SK" dirty="0"/>
-              <a:t>Slovník do hry </a:t>
-            </a:r>
-            <a:r>
-              <a:rPr lang="sk-SK"/>
-              <a:t>Hangman</a:t>
+              <a:rPr lang="en-US" dirty="0"/>
+              <a:t>Hangman - </a:t>
+            </a:r>
+            <a:r>
+              <a:rPr lang="en-US" dirty="0" err="1"/>
+              <a:t>obesenec</a:t>
             </a:r>
             <a:endParaRPr lang="sk-SK" dirty="0"/>
           </a:p>
@@ -5319,15 +5880,7 @@
             </a:r>
             <a:r>
               <a:rPr lang="sk-SK" dirty="0"/>
-              <a:t> IDEA si </a:t>
-            </a:r>
-            <a:r>
-              <a:rPr lang="en-US" dirty="0" err="1"/>
-              <a:t>otvori</a:t>
-            </a:r>
-            <a:r>
-              <a:rPr lang="sk-SK" dirty="0"/>
-              <a:t>ť projekt </a:t>
+              <a:t> IDEA si vytvoríme nový Java projekt s názvom </a:t>
             </a:r>
             <a:r>
               <a:rPr lang="sk-SK" dirty="0" err="1">
@@ -5353,7 +5906,23 @@
             </a:pPr>
             <a:r>
               <a:rPr lang="sk-SK" dirty="0"/>
-              <a:t>Vyskúšať, či ide</a:t>
+              <a:t>Pri vytváraní vypneme možnosť vytvorenia </a:t>
+            </a:r>
+            <a:r>
+              <a:rPr lang="sk-SK" i="1" dirty="0" err="1"/>
+              <a:t>Sample</a:t>
+            </a:r>
+            <a:r>
+              <a:rPr lang="sk-SK" i="1" dirty="0"/>
+              <a:t> </a:t>
+            </a:r>
+            <a:r>
+              <a:rPr lang="sk-SK" i="1" dirty="0" err="1"/>
+              <a:t>code</a:t>
+            </a:r>
+            <a:r>
+              <a:rPr lang="sk-SK" dirty="0"/>
+              <a:t>, ukážkového kódu.</a:t>
             </a:r>
           </a:p>
         </p:txBody>
@@ -5381,25 +5950,8 @@
           <a:p>
             <a:r>
               <a:rPr lang="sk-SK" dirty="0"/>
-              <a:t>Úloha </a:t>
-            </a:r>
-            <a:r>
-              <a:rPr lang="en-US" dirty="0"/>
-              <a:t>8</a:t>
-            </a:r>
-            <a:r>
-              <a:rPr lang="sk-SK" dirty="0"/>
-              <a:t>.1: Kontrola hry </a:t>
-            </a:r>
-            <a:r>
-              <a:rPr lang="sk-SK" dirty="0" err="1"/>
-              <a:t>Hangma</a:t>
-            </a:r>
-            <a:r>
-              <a:rPr lang="en-US" dirty="0"/>
-              <a:t>n</a:t>
-            </a:r>
-            <a:endParaRPr lang="sk-SK" dirty="0"/>
+              <a:t>Úloha 7.1: Nový projekt</a:t>
+            </a:r>
           </a:p>
         </p:txBody>
       </p:sp>
@@ -5452,13 +6004,8 @@
           <a:p>
             <a:r>
               <a:rPr lang="sk-SK" dirty="0"/>
-              <a:t>Úloha 8.2: Trieda </a:t>
-            </a:r>
-            <a:r>
-              <a:rPr lang="sk-SK" dirty="0" err="1"/>
-              <a:t>Slovnik</a:t>
-            </a:r>
-            <a:endParaRPr lang="sk-SK" dirty="0"/>
+              <a:t>Úloha 7.2: Trieda Stav</a:t>
+            </a:r>
           </a:p>
         </p:txBody>
       </p:sp>
@@ -5671,7 +6218,7 @@
                 </a:highlight>
                 <a:latin typeface="Consolas" panose="020B0609020204030204" pitchFamily="49" charset="0"/>
               </a:rPr>
-              <a:t>sk.spse.hangman.Slovnik</a:t>
+              <a:t>sk.spse.hangman.Stav</a:t>
             </a:r>
             <a:r>
               <a:rPr lang="sk-SK" dirty="0"/>
@@ -5759,29 +6306,16 @@
               <a:buNone/>
             </a:pPr>
             <a:r>
-              <a:rPr lang="sk-SK" dirty="0"/>
+              <a:rPr lang="sk-SK" sz="2400" dirty="0"/>
               <a:t>Vytvorte nasledovné </a:t>
             </a:r>
             <a:r>
-              <a:rPr lang="sk-SK" dirty="0" err="1"/>
+              <a:rPr lang="sk-SK" sz="2400" dirty="0" err="1"/>
               <a:t>getter</a:t>
             </a:r>
             <a:r>
-              <a:rPr lang="sk-SK" dirty="0"/>
-              <a:t> metódy v triede </a:t>
-            </a:r>
-            <a:r>
-              <a:rPr lang="sk-SK" dirty="0" err="1">
-                <a:highlight>
-                  <a:srgbClr val="FFFF00"/>
-                </a:highlight>
-                <a:latin typeface="Consolas" panose="020B0609020204030204" pitchFamily="49" charset="0"/>
-              </a:rPr>
-              <a:t>Slovnik</a:t>
-            </a:r>
-            <a:r>
-              <a:rPr lang="sk-SK" dirty="0"/>
-              <a:t>:</a:t>
+              <a:rPr lang="sk-SK" sz="2400" dirty="0"/>
+              <a:t> metódy v triede Stav:</a:t>
             </a:r>
           </a:p>
           <a:p>
@@ -5793,7 +6327,7 @@
               <a:buAutoNum type="arabicPeriod"/>
             </a:pPr>
             <a:r>
-              <a:rPr lang="sk-SK" dirty="0" err="1">
+              <a:rPr lang="sk-SK" sz="2400" dirty="0" err="1">
                 <a:highlight>
                   <a:srgbClr val="FFFF00"/>
                 </a:highlight>
@@ -5802,43 +6336,25 @@
               <a:t>public</a:t>
             </a:r>
             <a:r>
-              <a:rPr lang="sk-SK" dirty="0">
-                <a:highlight>
-                  <a:srgbClr val="FFFF00"/>
-                </a:highlight>
-                <a:latin typeface="Consolas" panose="020B0609020204030204" pitchFamily="49" charset="0"/>
-              </a:rPr>
-              <a:t> </a:t>
-            </a:r>
-            <a:r>
-              <a:rPr lang="sk-SK" dirty="0" err="1">
-                <a:highlight>
-                  <a:srgbClr val="FFFF00"/>
-                </a:highlight>
-                <a:latin typeface="Consolas" panose="020B0609020204030204" pitchFamily="49" charset="0"/>
-              </a:rPr>
-              <a:t>String</a:t>
-            </a:r>
-            <a:r>
-              <a:rPr lang="sk-SK" dirty="0">
-                <a:highlight>
-                  <a:srgbClr val="FFFF00"/>
-                </a:highlight>
-                <a:latin typeface="Consolas" panose="020B0609020204030204" pitchFamily="49" charset="0"/>
-              </a:rPr>
-              <a:t> </a:t>
-            </a:r>
-            <a:r>
-              <a:rPr lang="sk-SK" dirty="0" err="1">
-                <a:highlight>
-                  <a:srgbClr val="FFFF00"/>
-                </a:highlight>
-                <a:latin typeface="Consolas" panose="020B0609020204030204" pitchFamily="49" charset="0"/>
-              </a:rPr>
-              <a:t>getKategoria</a:t>
-            </a:r>
-            <a:r>
-              <a:rPr lang="sk-SK" dirty="0">
+              <a:rPr lang="sk-SK" sz="2400" dirty="0">
+                <a:highlight>
+                  <a:srgbClr val="FFFF00"/>
+                </a:highlight>
+                <a:latin typeface="Consolas" panose="020B0609020204030204" pitchFamily="49" charset="0"/>
+              </a:rPr>
+              <a:t> boolean </a:t>
+            </a:r>
+            <a:r>
+              <a:rPr lang="sk-SK" sz="2400" dirty="0" err="1">
+                <a:highlight>
+                  <a:srgbClr val="FFFF00"/>
+                </a:highlight>
+                <a:latin typeface="Consolas" panose="020B0609020204030204" pitchFamily="49" charset="0"/>
+              </a:rPr>
+              <a:t>isVyhra</a:t>
+            </a:r>
+            <a:r>
+              <a:rPr lang="sk-SK" sz="2400" dirty="0">
                 <a:highlight>
                   <a:srgbClr val="FFFF00"/>
                 </a:highlight>
@@ -5847,14 +6363,24 @@
               <a:t>()</a:t>
             </a:r>
             <a:r>
-              <a:rPr lang="sk-SK" dirty="0"/>
+              <a:rPr lang="sk-SK" sz="2400" dirty="0"/>
               <a:t> - vráti hodnotu atribútu </a:t>
             </a:r>
             <a:r>
-              <a:rPr lang="sk-SK" dirty="0" err="1"/>
-              <a:t>kategoria</a:t>
-            </a:r>
-            <a:endParaRPr lang="sk-SK" dirty="0"/>
+              <a:rPr lang="sk-SK" sz="2400" dirty="0" err="1">
+                <a:highlight>
+                  <a:srgbClr val="FFFF00"/>
+                </a:highlight>
+                <a:latin typeface="Consolas" panose="020B0609020204030204" pitchFamily="49" charset="0"/>
+              </a:rPr>
+              <a:t>vyhra</a:t>
+            </a:r>
+            <a:endParaRPr lang="sk-SK" sz="2400" dirty="0">
+              <a:highlight>
+                <a:srgbClr val="FFFF00"/>
+              </a:highlight>
+              <a:latin typeface="Consolas" panose="020B0609020204030204" pitchFamily="49" charset="0"/>
+            </a:endParaRPr>
           </a:p>
           <a:p>
             <a:pPr marL="457200" indent="-457200">
@@ -5865,7 +6391,7 @@
               <a:buAutoNum type="arabicPeriod"/>
             </a:pPr>
             <a:r>
-              <a:rPr lang="sk-SK" dirty="0" err="1">
+              <a:rPr lang="sk-SK" sz="2400" dirty="0" err="1">
                 <a:highlight>
                   <a:srgbClr val="FFFF00"/>
                 </a:highlight>
@@ -5874,43 +6400,25 @@
               <a:t>public</a:t>
             </a:r>
             <a:r>
-              <a:rPr lang="sk-SK" dirty="0">
-                <a:highlight>
-                  <a:srgbClr val="FFFF00"/>
-                </a:highlight>
-                <a:latin typeface="Consolas" panose="020B0609020204030204" pitchFamily="49" charset="0"/>
-              </a:rPr>
-              <a:t> </a:t>
-            </a:r>
-            <a:r>
-              <a:rPr lang="sk-SK" dirty="0" err="1">
-                <a:highlight>
-                  <a:srgbClr val="FFFF00"/>
-                </a:highlight>
-                <a:latin typeface="Consolas" panose="020B0609020204030204" pitchFamily="49" charset="0"/>
-              </a:rPr>
-              <a:t>int</a:t>
-            </a:r>
-            <a:r>
-              <a:rPr lang="sk-SK" dirty="0">
-                <a:highlight>
-                  <a:srgbClr val="FFFF00"/>
-                </a:highlight>
-                <a:latin typeface="Consolas" panose="020B0609020204030204" pitchFamily="49" charset="0"/>
-              </a:rPr>
-              <a:t> </a:t>
-            </a:r>
-            <a:r>
-              <a:rPr lang="sk-SK" dirty="0" err="1">
-                <a:highlight>
-                  <a:srgbClr val="FFFF00"/>
-                </a:highlight>
-                <a:latin typeface="Consolas" panose="020B0609020204030204" pitchFamily="49" charset="0"/>
-              </a:rPr>
-              <a:t>getSize</a:t>
-            </a:r>
-            <a:r>
-              <a:rPr lang="sk-SK" dirty="0">
+              <a:rPr lang="sk-SK" sz="2400" dirty="0">
+                <a:highlight>
+                  <a:srgbClr val="FFFF00"/>
+                </a:highlight>
+                <a:latin typeface="Consolas" panose="020B0609020204030204" pitchFamily="49" charset="0"/>
+              </a:rPr>
+              <a:t> boolean </a:t>
+            </a:r>
+            <a:r>
+              <a:rPr lang="sk-SK" sz="2400" dirty="0" err="1">
+                <a:highlight>
+                  <a:srgbClr val="FFFF00"/>
+                </a:highlight>
+                <a:latin typeface="Consolas" panose="020B0609020204030204" pitchFamily="49" charset="0"/>
+              </a:rPr>
+              <a:t>isGameOver</a:t>
+            </a:r>
+            <a:r>
+              <a:rPr lang="sk-SK" sz="2400" dirty="0">
                 <a:highlight>
                   <a:srgbClr val="FFFF00"/>
                 </a:highlight>
@@ -5919,9 +6427,37 @@
               <a:t>()</a:t>
             </a:r>
             <a:r>
-              <a:rPr lang="sk-SK" dirty="0"/>
-              <a:t> - vráti počet slov v slovníku</a:t>
-            </a:r>
+              <a:rPr lang="sk-SK" sz="2400" dirty="0"/>
+              <a:t> - vráti </a:t>
+            </a:r>
+            <a:r>
+              <a:rPr lang="sk-SK" sz="2400" dirty="0" err="1">
+                <a:highlight>
+                  <a:srgbClr val="FFFF00"/>
+                </a:highlight>
+                <a:latin typeface="Consolas" panose="020B0609020204030204" pitchFamily="49" charset="0"/>
+              </a:rPr>
+              <a:t>true</a:t>
+            </a:r>
+            <a:r>
+              <a:rPr lang="sk-SK" sz="2400" dirty="0"/>
+              <a:t>, ak je počet pokusov menší ako 1 alebo ak sme vyhrali, ináč vráti </a:t>
+            </a:r>
+            <a:r>
+              <a:rPr lang="sk-SK" sz="2400" dirty="0" err="1">
+                <a:highlight>
+                  <a:srgbClr val="FFFF00"/>
+                </a:highlight>
+                <a:latin typeface="Consolas" panose="020B0609020204030204" pitchFamily="49" charset="0"/>
+              </a:rPr>
+              <a:t>false</a:t>
+            </a:r>
+            <a:endParaRPr lang="sk-SK" sz="2400" dirty="0">
+              <a:highlight>
+                <a:srgbClr val="FFFF00"/>
+              </a:highlight>
+              <a:latin typeface="Consolas" panose="020B0609020204030204" pitchFamily="49" charset="0"/>
+            </a:endParaRPr>
           </a:p>
           <a:p>
             <a:pPr marL="457200" indent="-457200">
@@ -5932,7 +6468,7 @@
               <a:buAutoNum type="arabicPeriod"/>
             </a:pPr>
             <a:r>
-              <a:rPr lang="sk-SK" dirty="0" err="1">
+              <a:rPr lang="sk-SK" sz="2400" dirty="0" err="1">
                 <a:highlight>
                   <a:srgbClr val="FFFF00"/>
                 </a:highlight>
@@ -5941,7 +6477,7 @@
               <a:t>public</a:t>
             </a:r>
             <a:r>
-              <a:rPr lang="sk-SK" dirty="0">
+              <a:rPr lang="sk-SK" sz="2400" dirty="0">
                 <a:highlight>
                   <a:srgbClr val="FFFF00"/>
                 </a:highlight>
@@ -5950,7 +6486,74 @@
               <a:t> </a:t>
             </a:r>
             <a:r>
-              <a:rPr lang="sk-SK" dirty="0" err="1">
+              <a:rPr lang="sk-SK" sz="2400" dirty="0" err="1">
+                <a:highlight>
+                  <a:srgbClr val="FFFF00"/>
+                </a:highlight>
+                <a:latin typeface="Consolas" panose="020B0609020204030204" pitchFamily="49" charset="0"/>
+              </a:rPr>
+              <a:t>int</a:t>
+            </a:r>
+            <a:r>
+              <a:rPr lang="sk-SK" sz="2400" dirty="0">
+                <a:highlight>
+                  <a:srgbClr val="FFFF00"/>
+                </a:highlight>
+                <a:latin typeface="Consolas" panose="020B0609020204030204" pitchFamily="49" charset="0"/>
+              </a:rPr>
+              <a:t> </a:t>
+            </a:r>
+            <a:r>
+              <a:rPr lang="sk-SK" sz="2400" dirty="0" err="1">
+                <a:highlight>
+                  <a:srgbClr val="FFFF00"/>
+                </a:highlight>
+                <a:latin typeface="Consolas" panose="020B0609020204030204" pitchFamily="49" charset="0"/>
+              </a:rPr>
+              <a:t>getOstavaPokusov</a:t>
+            </a:r>
+            <a:r>
+              <a:rPr lang="sk-SK" sz="2400" dirty="0">
+                <a:highlight>
+                  <a:srgbClr val="FFFF00"/>
+                </a:highlight>
+                <a:latin typeface="Consolas" panose="020B0609020204030204" pitchFamily="49" charset="0"/>
+              </a:rPr>
+              <a:t>()</a:t>
+            </a:r>
+            <a:r>
+              <a:rPr lang="sk-SK" sz="2400" dirty="0"/>
+              <a:t> - vráti zostávajúci počet pokusov</a:t>
+            </a:r>
+          </a:p>
+          <a:p>
+            <a:pPr marL="457200" indent="-457200">
+              <a:lnSpc>
+                <a:spcPct val="100000"/>
+              </a:lnSpc>
+              <a:buFont typeface="+mj-lt"/>
+              <a:buAutoNum type="arabicPeriod"/>
+            </a:pPr>
+            <a:r>
+              <a:rPr lang="sk-SK" sz="2400" dirty="0" err="1">
+                <a:highlight>
+                  <a:srgbClr val="FFFF00"/>
+                </a:highlight>
+                <a:latin typeface="Consolas" panose="020B0609020204030204" pitchFamily="49" charset="0"/>
+              </a:rPr>
+              <a:t>public</a:t>
+            </a:r>
+            <a:r>
+              <a:rPr lang="sk-SK" sz="2400" dirty="0">
+                <a:highlight>
+                  <a:srgbClr val="FFFF00"/>
+                </a:highlight>
+                <a:latin typeface="Consolas" panose="020B0609020204030204" pitchFamily="49" charset="0"/>
+              </a:rPr>
+              <a:t> </a:t>
+            </a:r>
+            <a:r>
+              <a:rPr lang="sk-SK" sz="2400" dirty="0" err="1">
                 <a:highlight>
                   <a:srgbClr val="FFFF00"/>
                 </a:highlight>
@@ -5959,7 +6562,7 @@
               <a:t>String</a:t>
             </a:r>
             <a:r>
-              <a:rPr lang="sk-SK" dirty="0">
+              <a:rPr lang="sk-SK" sz="2400" dirty="0">
                 <a:highlight>
                   <a:srgbClr val="FFFF00"/>
                 </a:highlight>
@@ -5968,7 +6571,74 @@
               <a:t> </a:t>
             </a:r>
             <a:r>
-              <a:rPr lang="sk-SK" dirty="0" err="1">
+              <a:rPr lang="sk-SK" sz="2400" dirty="0" err="1">
+                <a:highlight>
+                  <a:srgbClr val="FFFF00"/>
+                </a:highlight>
+                <a:latin typeface="Consolas" panose="020B0609020204030204" pitchFamily="49" charset="0"/>
+              </a:rPr>
+              <a:t>getHadaneSlovo</a:t>
+            </a:r>
+            <a:r>
+              <a:rPr lang="sk-SK" sz="2400" dirty="0">
+                <a:highlight>
+                  <a:srgbClr val="FFFF00"/>
+                </a:highlight>
+                <a:latin typeface="Consolas" panose="020B0609020204030204" pitchFamily="49" charset="0"/>
+              </a:rPr>
+              <a:t>()</a:t>
+            </a:r>
+            <a:r>
+              <a:rPr lang="sk-SK" sz="2400" dirty="0"/>
+              <a:t> - vráti hádané slovo. Bonus: slovo vráti, iba ak hra skončila, ináč vyhodí výnimku</a:t>
+            </a:r>
+          </a:p>
+          <a:p>
+            <a:pPr marL="457200" indent="-457200">
+              <a:lnSpc>
+                <a:spcPct val="100000"/>
+              </a:lnSpc>
+              <a:buFont typeface="+mj-lt"/>
+              <a:buAutoNum type="arabicPeriod"/>
+            </a:pPr>
+            <a:r>
+              <a:rPr lang="sk-SK" sz="2400" dirty="0" err="1">
+                <a:highlight>
+                  <a:srgbClr val="FFFF00"/>
+                </a:highlight>
+                <a:latin typeface="Consolas" panose="020B0609020204030204" pitchFamily="49" charset="0"/>
+              </a:rPr>
+              <a:t>public</a:t>
+            </a:r>
+            <a:r>
+              <a:rPr lang="sk-SK" sz="2400" dirty="0">
+                <a:highlight>
+                  <a:srgbClr val="FFFF00"/>
+                </a:highlight>
+                <a:latin typeface="Consolas" panose="020B0609020204030204" pitchFamily="49" charset="0"/>
+              </a:rPr>
+              <a:t> </a:t>
+            </a:r>
+            <a:r>
+              <a:rPr lang="sk-SK" sz="2400" dirty="0" err="1">
+                <a:highlight>
+                  <a:srgbClr val="FFFF00"/>
+                </a:highlight>
+                <a:latin typeface="Consolas" panose="020B0609020204030204" pitchFamily="49" charset="0"/>
+              </a:rPr>
+              <a:t>String</a:t>
+            </a:r>
+            <a:r>
+              <a:rPr lang="sk-SK" sz="2400" dirty="0">
+                <a:highlight>
+                  <a:srgbClr val="FFFF00"/>
+                </a:highlight>
+                <a:latin typeface="Consolas" panose="020B0609020204030204" pitchFamily="49" charset="0"/>
+              </a:rPr>
+              <a:t> </a:t>
+            </a:r>
+            <a:r>
+              <a:rPr lang="sk-SK" sz="2400" dirty="0" err="1">
                 <a:highlight>
                   <a:srgbClr val="FFFF00"/>
                 </a:highlight>
@@ -5977,7 +6647,7 @@
               <a:t>getSlovo</a:t>
             </a:r>
             <a:r>
-              <a:rPr lang="sk-SK" dirty="0">
+              <a:rPr lang="sk-SK" sz="2400" dirty="0">
                 <a:highlight>
                   <a:srgbClr val="FFFF00"/>
                 </a:highlight>
@@ -5986,57 +6656,52 @@
               <a:t>()</a:t>
             </a:r>
             <a:r>
-              <a:rPr lang="sk-SK" dirty="0"/>
-              <a:t> - vráti náhodné slovo so slovníka. Náhodné číslo získate z objektu </a:t>
-            </a:r>
-            <a:r>
-              <a:rPr lang="sk-SK" dirty="0" err="1">
-                <a:highlight>
-                  <a:srgbClr val="FFFF00"/>
-                </a:highlight>
-                <a:latin typeface="Consolas" panose="020B0609020204030204" pitchFamily="49" charset="0"/>
-              </a:rPr>
-              <a:t>rand</a:t>
-            </a:r>
-            <a:r>
-              <a:rPr lang="sk-SK" dirty="0"/>
-              <a:t> pomocou </a:t>
-            </a:r>
-            <a:r>
-              <a:rPr lang="sk-SK" dirty="0" err="1">
-                <a:highlight>
-                  <a:srgbClr val="FFFF00"/>
-                </a:highlight>
-                <a:latin typeface="Consolas" panose="020B0609020204030204" pitchFamily="49" charset="0"/>
-              </a:rPr>
-              <a:t>rand.nextInt</a:t>
-            </a:r>
-            <a:r>
-              <a:rPr lang="sk-SK" dirty="0">
-                <a:highlight>
-                  <a:srgbClr val="FFFF00"/>
-                </a:highlight>
-                <a:latin typeface="Consolas" panose="020B0609020204030204" pitchFamily="49" charset="0"/>
-              </a:rPr>
-              <a:t>(</a:t>
-            </a:r>
-            <a:r>
-              <a:rPr lang="sk-SK" dirty="0" err="1">
-                <a:highlight>
-                  <a:srgbClr val="FFFF00"/>
-                </a:highlight>
-                <a:latin typeface="Consolas" panose="020B0609020204030204" pitchFamily="49" charset="0"/>
-              </a:rPr>
-              <a:t>slova.length</a:t>
-            </a:r>
-            <a:r>
-              <a:rPr lang="sk-SK" dirty="0">
-                <a:highlight>
-                  <a:srgbClr val="FFFF00"/>
-                </a:highlight>
-                <a:latin typeface="Consolas" panose="020B0609020204030204" pitchFamily="49" charset="0"/>
-              </a:rPr>
-              <a:t>)</a:t>
+              <a:rPr lang="sk-SK" sz="2400" dirty="0"/>
+              <a:t> - vráti slovo, ktoré sme zatiaľ uhádli. Kód tejto metódy musí vytvoriť reťazec </a:t>
+            </a:r>
+            <a:r>
+              <a:rPr lang="sk-SK" sz="2400" dirty="0" err="1">
+                <a:highlight>
+                  <a:srgbClr val="FFFF00"/>
+                </a:highlight>
+                <a:latin typeface="Consolas" panose="020B0609020204030204" pitchFamily="49" charset="0"/>
+              </a:rPr>
+              <a:t>String</a:t>
+            </a:r>
+            <a:r>
+              <a:rPr lang="sk-SK" sz="2400" dirty="0"/>
+              <a:t> z poľa znakov </a:t>
+            </a:r>
+            <a:r>
+              <a:rPr lang="sk-SK" sz="2400" dirty="0" err="1">
+                <a:highlight>
+                  <a:srgbClr val="FFFF00"/>
+                </a:highlight>
+                <a:latin typeface="Consolas" panose="020B0609020204030204" pitchFamily="49" charset="0"/>
+              </a:rPr>
+              <a:t>uhadnuteZnaky</a:t>
+            </a:r>
+            <a:r>
+              <a:rPr lang="sk-SK" sz="2400" dirty="0"/>
+              <a:t>. Môžete na to použiť statickú metódu </a:t>
+            </a:r>
+            <a:r>
+              <a:rPr lang="sk-SK" sz="2400" dirty="0" err="1">
+                <a:highlight>
+                  <a:srgbClr val="FFFF00"/>
+                </a:highlight>
+                <a:latin typeface="Consolas" panose="020B0609020204030204" pitchFamily="49" charset="0"/>
+              </a:rPr>
+              <a:t>String.valueOf</a:t>
+            </a:r>
+            <a:r>
+              <a:rPr lang="sk-SK" sz="2400" dirty="0">
+                <a:highlight>
+                  <a:srgbClr val="FFFF00"/>
+                </a:highlight>
+                <a:latin typeface="Consolas" panose="020B0609020204030204" pitchFamily="49" charset="0"/>
+              </a:rPr>
+              <a:t>()</a:t>
             </a:r>
           </a:p>
         </p:txBody>
@@ -6064,7 +6729,7 @@
           <a:p>
             <a:r>
               <a:rPr lang="sk-SK" dirty="0"/>
-              <a:t>Úloha 8.3: </a:t>
+              <a:t>Úloha 7.3: </a:t>
             </a:r>
             <a:r>
               <a:rPr lang="sk-SK" dirty="0" err="1"/>
@@ -6139,8 +6804,8 @@
         </p:nvSpPr>
         <p:spPr>
           <a:xfrm>
-            <a:off x="941832" y="1580558"/>
-            <a:ext cx="8321040" cy="4847673"/>
+            <a:off x="274320" y="1516550"/>
+            <a:ext cx="11759184" cy="4847673"/>
           </a:xfrm>
         </p:spPr>
         <p:txBody>
@@ -6153,11 +6818,11 @@
               <a:buNone/>
             </a:pPr>
             <a:r>
-              <a:rPr lang="sk-SK" dirty="0"/>
-              <a:t>Upravte konštruktor triedy </a:t>
-            </a:r>
-            <a:r>
-              <a:rPr lang="sk-SK" dirty="0">
+              <a:rPr lang="sk-SK" sz="2400" dirty="0"/>
+              <a:t>V triede </a:t>
+            </a:r>
+            <a:r>
+              <a:rPr lang="sk-SK" sz="2400" dirty="0">
                 <a:highlight>
                   <a:srgbClr val="FFFF00"/>
                 </a:highlight>
@@ -6166,41 +6831,291 @@
               <a:t>Stav</a:t>
             </a:r>
             <a:r>
-              <a:rPr lang="sk-SK" dirty="0"/>
-              <a:t> tak, aby namiesto argumentu </a:t>
-            </a:r>
-            <a:r>
-              <a:rPr lang="sk-SK" dirty="0" err="1">
-                <a:highlight>
-                  <a:srgbClr val="FFFF00"/>
-                </a:highlight>
-                <a:latin typeface="Consolas" panose="020B0609020204030204" pitchFamily="49" charset="0"/>
-              </a:rPr>
-              <a:t>hadaneSlovo</a:t>
-            </a:r>
-            <a:r>
-              <a:rPr lang="sk-SK" dirty="0"/>
-              <a:t> prijímala slovník.</a:t>
-            </a:r>
-          </a:p>
-          <a:p>
-            <a:pPr marL="0" indent="0">
-              <a:buNone/>
+              <a:rPr lang="sk-SK" sz="2400" dirty="0"/>
+              <a:t> vytvorte inštančnú metódu </a:t>
+            </a:r>
+            <a:r>
+              <a:rPr lang="sk-SK" sz="2400" dirty="0" err="1">
+                <a:highlight>
+                  <a:srgbClr val="FFFF00"/>
+                </a:highlight>
+                <a:latin typeface="Consolas" panose="020B0609020204030204" pitchFamily="49" charset="0"/>
+              </a:rPr>
+              <a:t>public</a:t>
+            </a:r>
+            <a:r>
+              <a:rPr lang="sk-SK" sz="2400" dirty="0">
+                <a:highlight>
+                  <a:srgbClr val="FFFF00"/>
+                </a:highlight>
+                <a:latin typeface="Consolas" panose="020B0609020204030204" pitchFamily="49" charset="0"/>
+              </a:rPr>
+              <a:t> boolean </a:t>
+            </a:r>
+            <a:r>
+              <a:rPr lang="sk-SK" sz="2400" dirty="0" err="1">
+                <a:highlight>
+                  <a:srgbClr val="FFFF00"/>
+                </a:highlight>
+                <a:latin typeface="Consolas" panose="020B0609020204030204" pitchFamily="49" charset="0"/>
+              </a:rPr>
+              <a:t>hadaj</a:t>
+            </a:r>
+            <a:r>
+              <a:rPr lang="sk-SK" sz="2400" dirty="0">
+                <a:highlight>
+                  <a:srgbClr val="FFFF00"/>
+                </a:highlight>
+                <a:latin typeface="Consolas" panose="020B0609020204030204" pitchFamily="49" charset="0"/>
+              </a:rPr>
+              <a:t>(</a:t>
+            </a:r>
+            <a:r>
+              <a:rPr lang="sk-SK" sz="2400" dirty="0" err="1">
+                <a:highlight>
+                  <a:srgbClr val="FFFF00"/>
+                </a:highlight>
+                <a:latin typeface="Consolas" panose="020B0609020204030204" pitchFamily="49" charset="0"/>
+              </a:rPr>
+              <a:t>char</a:t>
+            </a:r>
+            <a:r>
+              <a:rPr lang="sk-SK" sz="2400" dirty="0">
+                <a:highlight>
+                  <a:srgbClr val="FFFF00"/>
+                </a:highlight>
+                <a:latin typeface="Consolas" panose="020B0609020204030204" pitchFamily="49" charset="0"/>
+              </a:rPr>
+              <a:t> tip)</a:t>
+            </a:r>
+            <a:r>
+              <a:rPr lang="sk-SK" sz="2400" dirty="0"/>
+              <a:t>, ktorá bude meniť stav hry podľa zadaného znaku </a:t>
+            </a:r>
+            <a:r>
+              <a:rPr lang="sk-SK" sz="2400" dirty="0">
+                <a:highlight>
+                  <a:srgbClr val="FFFF00"/>
+                </a:highlight>
+                <a:latin typeface="Consolas" panose="020B0609020204030204" pitchFamily="49" charset="0"/>
+              </a:rPr>
+              <a:t>tip</a:t>
+            </a:r>
+            <a:r>
+              <a:rPr lang="sk-SK" sz="2400" dirty="0"/>
+              <a:t>. V tele metódy napíšte kód, ktorý urobí nasledovné:</a:t>
+            </a:r>
+          </a:p>
+          <a:p>
+            <a:pPr marL="457200" indent="-457200">
+              <a:buFont typeface="+mj-lt"/>
+              <a:buAutoNum type="arabicPeriod"/>
             </a:pPr>
             <a:r>
-              <a:rPr lang="sk-SK" dirty="0"/>
-              <a:t>Samotné hádané slovo v </a:t>
-            </a:r>
-            <a:r>
-              <a:rPr lang="sk-SK" dirty="0" err="1"/>
-              <a:t>konštruktori</a:t>
-            </a:r>
-            <a:r>
-              <a:rPr lang="sk-SK" dirty="0"/>
-              <a:t> získajte pomocou metódy </a:t>
-            </a:r>
-            <a:r>
-              <a:rPr lang="sk-SK" dirty="0" err="1">
+              <a:rPr lang="sk-SK" sz="2400" dirty="0"/>
+              <a:t>Vytvorí pomocnú </a:t>
+            </a:r>
+            <a:r>
+              <a:rPr lang="sk-SK" sz="2400" dirty="0">
+                <a:highlight>
+                  <a:srgbClr val="FFFF00"/>
+                </a:highlight>
+                <a:latin typeface="Consolas" panose="020B0609020204030204" pitchFamily="49" charset="0"/>
+              </a:rPr>
+              <a:t>boolean</a:t>
+            </a:r>
+            <a:r>
+              <a:rPr lang="sk-SK" sz="2400" dirty="0"/>
+              <a:t> premennú </a:t>
+            </a:r>
+            <a:r>
+              <a:rPr lang="sk-SK" sz="2400" dirty="0" err="1">
+                <a:highlight>
+                  <a:srgbClr val="FFFF00"/>
+                </a:highlight>
+                <a:latin typeface="Consolas" panose="020B0609020204030204" pitchFamily="49" charset="0"/>
+              </a:rPr>
+              <a:t>spravnyTip</a:t>
+            </a:r>
+            <a:r>
+              <a:rPr lang="sk-SK" sz="2400" dirty="0"/>
+              <a:t>, inicializuje ju na </a:t>
+            </a:r>
+            <a:r>
+              <a:rPr lang="sk-SK" sz="2400" dirty="0" err="1">
+                <a:highlight>
+                  <a:srgbClr val="FFFF00"/>
+                </a:highlight>
+                <a:latin typeface="Consolas" panose="020B0609020204030204" pitchFamily="49" charset="0"/>
+              </a:rPr>
+              <a:t>false</a:t>
+            </a:r>
+            <a:endParaRPr lang="sk-SK" sz="2400" dirty="0">
+              <a:highlight>
+                <a:srgbClr val="FFFF00"/>
+              </a:highlight>
+              <a:latin typeface="Consolas" panose="020B0609020204030204" pitchFamily="49" charset="0"/>
+            </a:endParaRPr>
+          </a:p>
+          <a:p>
+            <a:pPr marL="457200" indent="-457200">
+              <a:buFont typeface="+mj-lt"/>
+              <a:buAutoNum type="arabicPeriod"/>
+            </a:pPr>
+            <a:r>
+              <a:rPr lang="sk-SK" sz="2400" dirty="0"/>
+              <a:t>V cykle prejdite všetky znaky hádaného slova, a ak sa znak zhoduje so znakom tip, pridajte tento znak do poľa </a:t>
+            </a:r>
+            <a:r>
+              <a:rPr lang="sk-SK" sz="2400" dirty="0" err="1">
+                <a:highlight>
+                  <a:srgbClr val="FFFF00"/>
+                </a:highlight>
+                <a:latin typeface="Consolas" panose="020B0609020204030204" pitchFamily="49" charset="0"/>
+              </a:rPr>
+              <a:t>uhadnuteZnaky</a:t>
+            </a:r>
+            <a:r>
+              <a:rPr lang="sk-SK" sz="2400" dirty="0"/>
+              <a:t> na tú istú pozíciu, akú má v hľadanom slove. Ak sa znak zhoduje, nastavte premennú </a:t>
+            </a:r>
+            <a:r>
+              <a:rPr lang="sk-SK" sz="2400" dirty="0" err="1">
+                <a:highlight>
+                  <a:srgbClr val="FFFF00"/>
+                </a:highlight>
+                <a:latin typeface="Consolas" panose="020B0609020204030204" pitchFamily="49" charset="0"/>
+              </a:rPr>
+              <a:t>spravnyTip</a:t>
+            </a:r>
+            <a:r>
+              <a:rPr lang="sk-SK" sz="2400" dirty="0"/>
+              <a:t> na </a:t>
+            </a:r>
+            <a:r>
+              <a:rPr lang="sk-SK" sz="2400" dirty="0" err="1">
+                <a:highlight>
+                  <a:srgbClr val="FFFF00"/>
+                </a:highlight>
+                <a:latin typeface="Consolas" panose="020B0609020204030204" pitchFamily="49" charset="0"/>
+              </a:rPr>
+              <a:t>true</a:t>
+            </a:r>
+            <a:r>
+              <a:rPr lang="sk-SK" sz="2400" dirty="0"/>
+              <a:t> Pri porovnaní znakov použite metódu </a:t>
+            </a:r>
+            <a:r>
+              <a:rPr lang="sk-SK" sz="2400" dirty="0" err="1">
+                <a:highlight>
+                  <a:srgbClr val="FFFF00"/>
+                </a:highlight>
+                <a:latin typeface="Consolas" panose="020B0609020204030204" pitchFamily="49" charset="0"/>
+              </a:rPr>
+              <a:t>Character.toLowerCase</a:t>
+            </a:r>
+            <a:r>
+              <a:rPr lang="sk-SK" sz="2400" dirty="0">
+                <a:highlight>
+                  <a:srgbClr val="FFFF00"/>
+                </a:highlight>
+                <a:latin typeface="Consolas" panose="020B0609020204030204" pitchFamily="49" charset="0"/>
+              </a:rPr>
+              <a:t>(</a:t>
+            </a:r>
+            <a:r>
+              <a:rPr lang="sk-SK" sz="2400" dirty="0" err="1">
+                <a:highlight>
+                  <a:srgbClr val="FFFF00"/>
+                </a:highlight>
+                <a:latin typeface="Consolas" panose="020B0609020204030204" pitchFamily="49" charset="0"/>
+              </a:rPr>
+              <a:t>char</a:t>
+            </a:r>
+            <a:r>
+              <a:rPr lang="sk-SK" sz="2400" dirty="0">
+                <a:highlight>
+                  <a:srgbClr val="FFFF00"/>
+                </a:highlight>
+                <a:latin typeface="Consolas" panose="020B0609020204030204" pitchFamily="49" charset="0"/>
+              </a:rPr>
+              <a:t>)</a:t>
+            </a:r>
+            <a:r>
+              <a:rPr lang="sk-SK" sz="2400" dirty="0"/>
+              <a:t>, aby sme pri nebrali ohľad na veľkosť písmen.</a:t>
+            </a:r>
+          </a:p>
+          <a:p>
+            <a:pPr marL="457200" indent="-457200">
+              <a:buFont typeface="+mj-lt"/>
+              <a:buAutoNum type="arabicPeriod"/>
+            </a:pPr>
+            <a:r>
+              <a:rPr lang="sk-SK" sz="2400" dirty="0"/>
+              <a:t>Ak nenastal správny tip, </a:t>
+            </a:r>
+            <a:r>
+              <a:rPr lang="sk-SK" sz="2400" dirty="0" err="1"/>
+              <a:t>dekrementuje</a:t>
+            </a:r>
+            <a:r>
+              <a:rPr lang="sk-SK" sz="2400" dirty="0"/>
+              <a:t> atribút </a:t>
+            </a:r>
+            <a:r>
+              <a:rPr lang="sk-SK" sz="2400" dirty="0" err="1">
+                <a:highlight>
+                  <a:srgbClr val="FFFF00"/>
+                </a:highlight>
+                <a:latin typeface="Consolas" panose="020B0609020204030204" pitchFamily="49" charset="0"/>
+              </a:rPr>
+              <a:t>ostavaPokusov</a:t>
+            </a:r>
+            <a:endParaRPr lang="sk-SK" sz="2400" dirty="0">
+              <a:highlight>
+                <a:srgbClr val="FFFF00"/>
+              </a:highlight>
+              <a:latin typeface="Consolas" panose="020B0609020204030204" pitchFamily="49" charset="0"/>
+            </a:endParaRPr>
+          </a:p>
+          <a:p>
+            <a:pPr marL="457200" indent="-457200">
+              <a:buFont typeface="+mj-lt"/>
+              <a:buAutoNum type="arabicPeriod"/>
+            </a:pPr>
+            <a:r>
+              <a:rPr lang="sk-SK" sz="2400" dirty="0"/>
+              <a:t>Ak je sme uhádli celé slovo, atribút </a:t>
+            </a:r>
+            <a:r>
+              <a:rPr lang="sk-SK" sz="2400" dirty="0" err="1">
+                <a:highlight>
+                  <a:srgbClr val="FFFF00"/>
+                </a:highlight>
+                <a:latin typeface="Consolas" panose="020B0609020204030204" pitchFamily="49" charset="0"/>
+              </a:rPr>
+              <a:t>vyhra</a:t>
+            </a:r>
+            <a:r>
+              <a:rPr lang="sk-SK" sz="2400" dirty="0"/>
+              <a:t> nastaví na </a:t>
+            </a:r>
+            <a:r>
+              <a:rPr lang="sk-SK" sz="2400" dirty="0" err="1">
+                <a:highlight>
+                  <a:srgbClr val="FFFF00"/>
+                </a:highlight>
+                <a:latin typeface="Consolas" panose="020B0609020204030204" pitchFamily="49" charset="0"/>
+              </a:rPr>
+              <a:t>true</a:t>
+            </a:r>
+            <a:r>
+              <a:rPr lang="sk-SK" sz="2400" dirty="0"/>
+              <a:t>. Uhádnutie zistite porovnaním hádaného slova zo slovom, ktoré vracia metóda </a:t>
+            </a:r>
+            <a:r>
+              <a:rPr lang="sk-SK" sz="2400" dirty="0" err="1">
                 <a:highlight>
                   <a:srgbClr val="FFFF00"/>
                 </a:highlight>
@@ -6209,7 +7124,7 @@
               <a:t>getSlovo</a:t>
             </a:r>
             <a:r>
-              <a:rPr lang="sk-SK" dirty="0">
+              <a:rPr lang="sk-SK" sz="2400" dirty="0">
                 <a:highlight>
                   <a:srgbClr val="FFFF00"/>
                 </a:highlight>
@@ -6217,6 +7132,31 @@
               </a:rPr>
               <a:t>()</a:t>
             </a:r>
+          </a:p>
+          <a:p>
+            <a:pPr marL="457200" indent="-457200">
+              <a:buFont typeface="+mj-lt"/>
+              <a:buAutoNum type="arabicPeriod"/>
+            </a:pPr>
+            <a:r>
+              <a:rPr lang="sk-SK" sz="2400" dirty="0"/>
+              <a:t>Metóda vráti hodnotu premennej </a:t>
+            </a:r>
+            <a:r>
+              <a:rPr lang="sk-SK" sz="2400" dirty="0" err="1">
+                <a:highlight>
+                  <a:srgbClr val="FFFF00"/>
+                </a:highlight>
+                <a:latin typeface="Consolas" panose="020B0609020204030204" pitchFamily="49" charset="0"/>
+              </a:rPr>
+              <a:t>spravnyTip</a:t>
+            </a:r>
+            <a:endParaRPr lang="sk-SK" sz="2400" dirty="0">
+              <a:highlight>
+                <a:srgbClr val="FFFF00"/>
+              </a:highlight>
+              <a:latin typeface="Consolas" panose="020B0609020204030204" pitchFamily="49" charset="0"/>
+            </a:endParaRPr>
           </a:p>
         </p:txBody>
       </p:sp>
@@ -6245,7 +7185,7 @@
           <a:p>
             <a:r>
               <a:rPr lang="sk-SK" dirty="0"/>
-              <a:t>Úloha 8.4: Úprava triedy Stav</a:t>
+              <a:t>Úloha 7.4: Inštančná metóda</a:t>
             </a:r>
           </a:p>
         </p:txBody>
@@ -6279,7 +7219,7 @@
         <p:cNvPr id="1" name="">
           <a:extLst>
             <a:ext uri="{FF2B5EF4-FFF2-40B4-BE49-F238E27FC236}">
-              <a16:creationId xmlns:a16="http://schemas.microsoft.com/office/drawing/2014/main" id="{3B551A81-6904-87EA-81B4-9ACB23717B2B}"/>
+              <a16:creationId xmlns:a16="http://schemas.microsoft.com/office/drawing/2014/main" id="{F49DB719-8AD4-4CE7-D65F-475128E3FBB8}"/>
             </a:ext>
           </a:extLst>
         </p:cNvPr>
@@ -6296,10 +7236,10 @@
       </p:grpSpPr>
       <p:sp>
         <p:nvSpPr>
-          <p:cNvPr id="3" name="Zástupný objekt pre obsah 2">
+          <p:cNvPr id="4" name="Zástupný objekt pre obsah 3">
             <a:extLst>
               <a:ext uri="{FF2B5EF4-FFF2-40B4-BE49-F238E27FC236}">
-                <a16:creationId xmlns:a16="http://schemas.microsoft.com/office/drawing/2014/main" id="{2AC920B8-CC05-3D35-CF43-57730DFABE16}"/>
+                <a16:creationId xmlns:a16="http://schemas.microsoft.com/office/drawing/2014/main" id="{DCBA214B-CD6B-90B6-D5F7-0DE08E8EAAFC}"/>
               </a:ext>
             </a:extLst>
           </p:cNvPr>
@@ -6310,132 +7250,21 @@
             <p:ph idx="1"/>
           </p:nvPr>
         </p:nvSpPr>
-        <p:spPr>
-          <a:xfrm>
-            <a:off x="931383" y="1483710"/>
-            <a:ext cx="10422417" cy="1738714"/>
-          </a:xfrm>
-        </p:spPr>
-        <p:txBody>
-          <a:bodyPr>
-            <a:noAutofit/>
-          </a:bodyPr>
+        <p:spPr/>
+        <p:txBody>
+          <a:bodyPr/>
           <a:lstStyle/>
           <a:p>
-            <a:pPr marL="0" indent="0">
-              <a:buNone/>
-            </a:pPr>
-            <a:r>
-              <a:rPr lang="sk-SK" dirty="0"/>
-              <a:t>Do triedy </a:t>
-            </a:r>
-            <a:r>
-              <a:rPr lang="sk-SK" dirty="0">
-                <a:highlight>
-                  <a:srgbClr val="FFFF00"/>
-                </a:highlight>
-                <a:latin typeface="Consolas" panose="020B0609020204030204" pitchFamily="49" charset="0"/>
-              </a:rPr>
-              <a:t>Hra</a:t>
-            </a:r>
-            <a:r>
-              <a:rPr lang="sk-SK" dirty="0"/>
-              <a:t> pridajte statickú metódu </a:t>
-            </a:r>
-            <a:r>
-              <a:rPr lang="sk-SK" dirty="0" err="1">
-                <a:highlight>
-                  <a:srgbClr val="FFFF00"/>
-                </a:highlight>
-                <a:latin typeface="Consolas" panose="020B0609020204030204" pitchFamily="49" charset="0"/>
-              </a:rPr>
-              <a:t>getSlovnikJedal</a:t>
-            </a:r>
-            <a:r>
-              <a:rPr lang="sk-SK" dirty="0">
-                <a:highlight>
-                  <a:srgbClr val="FFFF00"/>
-                </a:highlight>
-                <a:latin typeface="Consolas" panose="020B0609020204030204" pitchFamily="49" charset="0"/>
-              </a:rPr>
-              <a:t>()</a:t>
-            </a:r>
-            <a:r>
-              <a:rPr lang="sk-SK" dirty="0"/>
-              <a:t> podľa kódu v učebnici</a:t>
-            </a:r>
-          </a:p>
-          <a:p>
-            <a:pPr marL="0" indent="0">
-              <a:buNone/>
-            </a:pPr>
-            <a:r>
-              <a:rPr lang="sk-SK" dirty="0"/>
-              <a:t>Upravte metódu </a:t>
-            </a:r>
-            <a:r>
-              <a:rPr lang="sk-SK" dirty="0" err="1">
-                <a:highlight>
-                  <a:srgbClr val="FFFF00"/>
-                </a:highlight>
-                <a:latin typeface="Consolas" panose="020B0609020204030204" pitchFamily="49" charset="0"/>
-              </a:rPr>
-              <a:t>novaTextovaHra</a:t>
-            </a:r>
-            <a:r>
-              <a:rPr lang="sk-SK" dirty="0">
-                <a:highlight>
-                  <a:srgbClr val="FFFF00"/>
-                </a:highlight>
-                <a:latin typeface="Consolas" panose="020B0609020204030204" pitchFamily="49" charset="0"/>
-              </a:rPr>
-              <a:t>()</a:t>
-            </a:r>
-            <a:r>
-              <a:rPr lang="sk-SK" dirty="0"/>
-              <a:t> tak, aby namiesto premennej </a:t>
-            </a:r>
-            <a:r>
-              <a:rPr lang="sk-SK" dirty="0" err="1">
-                <a:highlight>
-                  <a:srgbClr val="FFFF00"/>
-                </a:highlight>
-                <a:latin typeface="Consolas" panose="020B0609020204030204" pitchFamily="49" charset="0"/>
-              </a:rPr>
-              <a:t>hadaneSlovo</a:t>
-            </a:r>
-            <a:r>
-              <a:rPr lang="sk-SK" dirty="0"/>
-              <a:t> použila slovník jedál.</a:t>
-            </a:r>
-          </a:p>
-          <a:p>
-            <a:pPr marL="0" indent="0">
-              <a:buNone/>
-            </a:pPr>
-            <a:r>
-              <a:rPr lang="sk-SK" b="1" dirty="0"/>
-              <a:t>Vyskúšajte spustiť program</a:t>
-            </a:r>
-            <a:r>
-              <a:rPr lang="sk-SK" dirty="0"/>
-              <a:t>, mal by fungovať</a:t>
-            </a:r>
-          </a:p>
-          <a:p>
-            <a:pPr marL="0" indent="0">
-              <a:buNone/>
-            </a:pPr>
-            <a:endParaRPr lang="sk-SK" dirty="0"/>
-          </a:p>
-        </p:txBody>
-      </p:sp>
-      <p:sp>
-        <p:nvSpPr>
-          <p:cNvPr id="5" name="Nadpis 4">
+            <a:endParaRPr lang="sk-SK"/>
+          </a:p>
+        </p:txBody>
+      </p:sp>
+      <p:sp>
+        <p:nvSpPr>
+          <p:cNvPr id="7" name="Nadpis 6">
             <a:extLst>
               <a:ext uri="{FF2B5EF4-FFF2-40B4-BE49-F238E27FC236}">
-                <a16:creationId xmlns:a16="http://schemas.microsoft.com/office/drawing/2014/main" id="{F1355515-B689-7503-ACFE-72404BA9050A}"/>
+                <a16:creationId xmlns:a16="http://schemas.microsoft.com/office/drawing/2014/main" id="{5B20DF76-22D5-1953-2F37-49C53B4C7D6B}"/>
               </a:ext>
             </a:extLst>
           </p:cNvPr>
@@ -6451,369 +7280,44 @@
           <a:bodyPr/>
           <a:lstStyle/>
           <a:p>
-            <a:r>
-              <a:rPr lang="sk-SK" dirty="0"/>
-              <a:t>Úloha </a:t>
-            </a:r>
-            <a:r>
-              <a:rPr lang="en-US" dirty="0"/>
-              <a:t>8</a:t>
-            </a:r>
-            <a:r>
-              <a:rPr lang="sk-SK" dirty="0"/>
-              <a:t>.5: Slovník jedál priamo v kóde</a:t>
-            </a:r>
-          </a:p>
-        </p:txBody>
-      </p:sp>
-      <p:sp>
-        <p:nvSpPr>
-          <p:cNvPr id="2" name="Nadpis 4">
+            <a:endParaRPr lang="sk-SK"/>
+          </a:p>
+        </p:txBody>
+      </p:sp>
+      <p:pic>
+        <p:nvPicPr>
+          <p:cNvPr id="9" name="Obrázok 8">
             <a:extLst>
               <a:ext uri="{FF2B5EF4-FFF2-40B4-BE49-F238E27FC236}">
-                <a16:creationId xmlns:a16="http://schemas.microsoft.com/office/drawing/2014/main" id="{7D9B2542-902A-55E6-BAC6-AB6F54761B53}"/>
+                <a16:creationId xmlns:a16="http://schemas.microsoft.com/office/drawing/2014/main" id="{7C0E4462-8686-76B8-54A2-54265351398E}"/>
               </a:ext>
             </a:extLst>
           </p:cNvPr>
-          <p:cNvSpPr txBox="1">
-            <a:spLocks/>
-          </p:cNvSpPr>
+          <p:cNvPicPr>
+            <a:picLocks noChangeAspect="1"/>
+          </p:cNvPicPr>
           <p:nvPr/>
-        </p:nvSpPr>
+        </p:nvPicPr>
+        <p:blipFill>
+          <a:blip r:embed="rId2"/>
+          <a:stretch>
+            <a:fillRect/>
+          </a:stretch>
+        </p:blipFill>
         <p:spPr>
           <a:xfrm>
-            <a:off x="771144" y="3547872"/>
-            <a:ext cx="10515600" cy="1325563"/>
+            <a:off x="3631256" y="365125"/>
+            <a:ext cx="4166265" cy="5941526"/>
           </a:xfrm>
           <a:prstGeom prst="rect">
             <a:avLst/>
           </a:prstGeom>
         </p:spPr>
-        <p:txBody>
-          <a:bodyPr vert="horz" lIns="91440" tIns="45720" rIns="91440" bIns="45720" rtlCol="0" anchor="ctr">
-            <a:normAutofit/>
-          </a:bodyPr>
-          <a:lstStyle>
-            <a:lvl1pPr algn="l" defTabSz="914400" rtl="0" eaLnBrk="1" latinLnBrk="0" hangingPunct="1">
-              <a:lnSpc>
-                <a:spcPct val="90000"/>
-              </a:lnSpc>
-              <a:spcBef>
-                <a:spcPct val="0"/>
-              </a:spcBef>
-              <a:buNone/>
-              <a:defRPr sz="4400" kern="1200">
-                <a:solidFill>
-                  <a:schemeClr val="tx1"/>
-                </a:solidFill>
-                <a:latin typeface="+mj-lt"/>
-                <a:ea typeface="+mj-ea"/>
-                <a:cs typeface="+mj-cs"/>
-              </a:defRPr>
-            </a:lvl1pPr>
-          </a:lstStyle>
-          <a:p>
-            <a:r>
-              <a:rPr lang="sk-SK" dirty="0"/>
-              <a:t>Úloha 8.6:  </a:t>
-            </a:r>
-            <a:r>
-              <a:rPr lang="sk-SK" dirty="0" err="1"/>
-              <a:t>Intro</a:t>
-            </a:r>
-            <a:r>
-              <a:rPr lang="sk-SK" dirty="0"/>
-              <a:t> text pre slovník</a:t>
-            </a:r>
-          </a:p>
-        </p:txBody>
-      </p:sp>
-      <p:sp>
-        <p:nvSpPr>
-          <p:cNvPr id="4" name="Zástupný objekt pre obsah 2">
-            <a:extLst>
-              <a:ext uri="{FF2B5EF4-FFF2-40B4-BE49-F238E27FC236}">
-                <a16:creationId xmlns:a16="http://schemas.microsoft.com/office/drawing/2014/main" id="{A5197F50-B8B1-0989-C32B-C629A4ECEFB9}"/>
-              </a:ext>
-            </a:extLst>
-          </p:cNvPr>
-          <p:cNvSpPr txBox="1">
-            <a:spLocks/>
-          </p:cNvSpPr>
-          <p:nvPr/>
-        </p:nvSpPr>
-        <p:spPr>
-          <a:xfrm>
-            <a:off x="957942" y="4573830"/>
-            <a:ext cx="10276115" cy="1472903"/>
-          </a:xfrm>
-          <a:prstGeom prst="rect">
-            <a:avLst/>
-          </a:prstGeom>
-        </p:spPr>
-        <p:txBody>
-          <a:bodyPr vert="horz" lIns="91440" tIns="45720" rIns="91440" bIns="45720" rtlCol="0">
-            <a:noAutofit/>
-          </a:bodyPr>
-          <a:lstStyle>
-            <a:lvl1pPr marL="228600" indent="-228600" algn="l" defTabSz="914400" rtl="0" eaLnBrk="1" latinLnBrk="0" hangingPunct="1">
-              <a:lnSpc>
-                <a:spcPct val="90000"/>
-              </a:lnSpc>
-              <a:spcBef>
-                <a:spcPts val="1000"/>
-              </a:spcBef>
-              <a:buFont typeface="Arial" panose="020B0604020202020204" pitchFamily="34" charset="0"/>
-              <a:buChar char="•"/>
-              <a:defRPr sz="2800" kern="1200">
-                <a:solidFill>
-                  <a:schemeClr val="tx1"/>
-                </a:solidFill>
-                <a:latin typeface="+mn-lt"/>
-                <a:ea typeface="+mn-ea"/>
-                <a:cs typeface="+mn-cs"/>
-              </a:defRPr>
-            </a:lvl1pPr>
-            <a:lvl2pPr marL="685800" indent="-228600" algn="l" defTabSz="914400" rtl="0" eaLnBrk="1" latinLnBrk="0" hangingPunct="1">
-              <a:lnSpc>
-                <a:spcPct val="90000"/>
-              </a:lnSpc>
-              <a:spcBef>
-                <a:spcPts val="500"/>
-              </a:spcBef>
-              <a:buFont typeface="Arial" panose="020B0604020202020204" pitchFamily="34" charset="0"/>
-              <a:buChar char="•"/>
-              <a:defRPr sz="2400" kern="1200">
-                <a:solidFill>
-                  <a:schemeClr val="tx1"/>
-                </a:solidFill>
-                <a:latin typeface="+mn-lt"/>
-                <a:ea typeface="+mn-ea"/>
-                <a:cs typeface="+mn-cs"/>
-              </a:defRPr>
-            </a:lvl2pPr>
-            <a:lvl3pPr marL="1143000" indent="-228600" algn="l" defTabSz="914400" rtl="0" eaLnBrk="1" latinLnBrk="0" hangingPunct="1">
-              <a:lnSpc>
-                <a:spcPct val="90000"/>
-              </a:lnSpc>
-              <a:spcBef>
-                <a:spcPts val="500"/>
-              </a:spcBef>
-              <a:buFont typeface="Arial" panose="020B0604020202020204" pitchFamily="34" charset="0"/>
-              <a:buChar char="•"/>
-              <a:defRPr sz="2000" kern="1200">
-                <a:solidFill>
-                  <a:schemeClr val="tx1"/>
-                </a:solidFill>
-                <a:latin typeface="+mn-lt"/>
-                <a:ea typeface="+mn-ea"/>
-                <a:cs typeface="+mn-cs"/>
-              </a:defRPr>
-            </a:lvl3pPr>
-            <a:lvl4pPr marL="1600200" indent="-228600" algn="l" defTabSz="914400" rtl="0" eaLnBrk="1" latinLnBrk="0" hangingPunct="1">
-              <a:lnSpc>
-                <a:spcPct val="90000"/>
-              </a:lnSpc>
-              <a:spcBef>
-                <a:spcPts val="500"/>
-              </a:spcBef>
-              <a:buFont typeface="Arial" panose="020B0604020202020204" pitchFamily="34" charset="0"/>
-              <a:buChar char="•"/>
-              <a:defRPr sz="1800" kern="1200">
-                <a:solidFill>
-                  <a:schemeClr val="tx1"/>
-                </a:solidFill>
-                <a:latin typeface="+mn-lt"/>
-                <a:ea typeface="+mn-ea"/>
-                <a:cs typeface="+mn-cs"/>
-              </a:defRPr>
-            </a:lvl4pPr>
-            <a:lvl5pPr marL="2057400" indent="-228600" algn="l" defTabSz="914400" rtl="0" eaLnBrk="1" latinLnBrk="0" hangingPunct="1">
-              <a:lnSpc>
-                <a:spcPct val="90000"/>
-              </a:lnSpc>
-              <a:spcBef>
-                <a:spcPts val="500"/>
-              </a:spcBef>
-              <a:buFont typeface="Arial" panose="020B0604020202020204" pitchFamily="34" charset="0"/>
-              <a:buChar char="•"/>
-              <a:defRPr sz="1800" kern="1200">
-                <a:solidFill>
-                  <a:schemeClr val="tx1"/>
-                </a:solidFill>
-                <a:latin typeface="+mn-lt"/>
-                <a:ea typeface="+mn-ea"/>
-                <a:cs typeface="+mn-cs"/>
-              </a:defRPr>
-            </a:lvl5pPr>
-            <a:lvl6pPr marL="2514600" indent="-228600" algn="l" defTabSz="914400" rtl="0" eaLnBrk="1" latinLnBrk="0" hangingPunct="1">
-              <a:lnSpc>
-                <a:spcPct val="90000"/>
-              </a:lnSpc>
-              <a:spcBef>
-                <a:spcPts val="500"/>
-              </a:spcBef>
-              <a:buFont typeface="Arial" panose="020B0604020202020204" pitchFamily="34" charset="0"/>
-              <a:buChar char="•"/>
-              <a:defRPr sz="1800" kern="1200">
-                <a:solidFill>
-                  <a:schemeClr val="tx1"/>
-                </a:solidFill>
-                <a:latin typeface="+mn-lt"/>
-                <a:ea typeface="+mn-ea"/>
-                <a:cs typeface="+mn-cs"/>
-              </a:defRPr>
-            </a:lvl6pPr>
-            <a:lvl7pPr marL="2971800" indent="-228600" algn="l" defTabSz="914400" rtl="0" eaLnBrk="1" latinLnBrk="0" hangingPunct="1">
-              <a:lnSpc>
-                <a:spcPct val="90000"/>
-              </a:lnSpc>
-              <a:spcBef>
-                <a:spcPts val="500"/>
-              </a:spcBef>
-              <a:buFont typeface="Arial" panose="020B0604020202020204" pitchFamily="34" charset="0"/>
-              <a:buChar char="•"/>
-              <a:defRPr sz="1800" kern="1200">
-                <a:solidFill>
-                  <a:schemeClr val="tx1"/>
-                </a:solidFill>
-                <a:latin typeface="+mn-lt"/>
-                <a:ea typeface="+mn-ea"/>
-                <a:cs typeface="+mn-cs"/>
-              </a:defRPr>
-            </a:lvl7pPr>
-            <a:lvl8pPr marL="3429000" indent="-228600" algn="l" defTabSz="914400" rtl="0" eaLnBrk="1" latinLnBrk="0" hangingPunct="1">
-              <a:lnSpc>
-                <a:spcPct val="90000"/>
-              </a:lnSpc>
-              <a:spcBef>
-                <a:spcPts val="500"/>
-              </a:spcBef>
-              <a:buFont typeface="Arial" panose="020B0604020202020204" pitchFamily="34" charset="0"/>
-              <a:buChar char="•"/>
-              <a:defRPr sz="1800" kern="1200">
-                <a:solidFill>
-                  <a:schemeClr val="tx1"/>
-                </a:solidFill>
-                <a:latin typeface="+mn-lt"/>
-                <a:ea typeface="+mn-ea"/>
-                <a:cs typeface="+mn-cs"/>
-              </a:defRPr>
-            </a:lvl8pPr>
-            <a:lvl9pPr marL="3886200" indent="-228600" algn="l" defTabSz="914400" rtl="0" eaLnBrk="1" latinLnBrk="0" hangingPunct="1">
-              <a:lnSpc>
-                <a:spcPct val="90000"/>
-              </a:lnSpc>
-              <a:spcBef>
-                <a:spcPts val="500"/>
-              </a:spcBef>
-              <a:buFont typeface="Arial" panose="020B0604020202020204" pitchFamily="34" charset="0"/>
-              <a:buChar char="•"/>
-              <a:defRPr sz="1800" kern="1200">
-                <a:solidFill>
-                  <a:schemeClr val="tx1"/>
-                </a:solidFill>
-                <a:latin typeface="+mn-lt"/>
-                <a:ea typeface="+mn-ea"/>
-                <a:cs typeface="+mn-cs"/>
-              </a:defRPr>
-            </a:lvl9pPr>
-          </a:lstStyle>
-          <a:p>
-            <a:pPr marL="0" indent="0">
-              <a:lnSpc>
-                <a:spcPct val="100000"/>
-              </a:lnSpc>
-              <a:buNone/>
-            </a:pPr>
-            <a:r>
-              <a:rPr lang="sk-SK" dirty="0"/>
-              <a:t>Do triedy </a:t>
-            </a:r>
-            <a:r>
-              <a:rPr lang="sk-SK" dirty="0" err="1">
-                <a:highlight>
-                  <a:srgbClr val="FFFF00"/>
-                </a:highlight>
-                <a:latin typeface="Consolas" panose="020B0609020204030204" pitchFamily="49" charset="0"/>
-              </a:rPr>
-              <a:t>TextoveUI</a:t>
-            </a:r>
-            <a:r>
-              <a:rPr lang="sk-SK" dirty="0"/>
-              <a:t> pridajte metódu </a:t>
-            </a:r>
-            <a:r>
-              <a:rPr lang="sk-SK" dirty="0" err="1">
-                <a:highlight>
-                  <a:srgbClr val="FFFF00"/>
-                </a:highlight>
-                <a:latin typeface="Consolas" panose="020B0609020204030204" pitchFamily="49" charset="0"/>
-              </a:rPr>
-              <a:t>vypisIntroSlovnika</a:t>
-            </a:r>
-            <a:r>
-              <a:rPr lang="sk-SK" dirty="0">
-                <a:highlight>
-                  <a:srgbClr val="FFFF00"/>
-                </a:highlight>
-                <a:latin typeface="Consolas" panose="020B0609020204030204" pitchFamily="49" charset="0"/>
-              </a:rPr>
-              <a:t>()</a:t>
-            </a:r>
-            <a:r>
-              <a:rPr lang="sk-SK" dirty="0"/>
-              <a:t> podľa kódu z učebnice</a:t>
-            </a:r>
-          </a:p>
-          <a:p>
-            <a:pPr marL="0" indent="0">
-              <a:lnSpc>
-                <a:spcPct val="100000"/>
-              </a:lnSpc>
-              <a:buNone/>
-            </a:pPr>
-            <a:r>
-              <a:rPr lang="sk-SK" dirty="0"/>
-              <a:t>Upravte metódu </a:t>
-            </a:r>
-            <a:r>
-              <a:rPr lang="sk-SK" dirty="0" err="1">
-                <a:highlight>
-                  <a:srgbClr val="FFFF00"/>
-                </a:highlight>
-                <a:latin typeface="Consolas" panose="020B0609020204030204" pitchFamily="49" charset="0"/>
-              </a:rPr>
-              <a:t>novaTextovaHra</a:t>
-            </a:r>
-            <a:r>
-              <a:rPr lang="sk-SK" dirty="0">
-                <a:highlight>
-                  <a:srgbClr val="FFFF00"/>
-                </a:highlight>
-                <a:latin typeface="Consolas" panose="020B0609020204030204" pitchFamily="49" charset="0"/>
-              </a:rPr>
-              <a:t>()</a:t>
-            </a:r>
-            <a:r>
-              <a:rPr lang="sk-SK" dirty="0"/>
-              <a:t> tak, aby na začiatku programu vypísal </a:t>
-            </a:r>
-            <a:r>
-              <a:rPr lang="sk-SK" dirty="0" err="1"/>
-              <a:t>intro</a:t>
-            </a:r>
-            <a:r>
-              <a:rPr lang="sk-SK" dirty="0"/>
-              <a:t> text slovníka</a:t>
-            </a:r>
-          </a:p>
-        </p:txBody>
-      </p:sp>
+      </p:pic>
     </p:spTree>
     <p:extLst>
       <p:ext uri="{BB962C8B-B14F-4D97-AF65-F5344CB8AC3E}">
-        <p14:creationId xmlns:p14="http://schemas.microsoft.com/office/powerpoint/2010/main" val="1128953922"/>
+        <p14:creationId xmlns:p14="http://schemas.microsoft.com/office/powerpoint/2010/main" val="3126804121"/>
       </p:ext>
     </p:extLst>
   </p:cSld>
@@ -6839,7 +7343,7 @@
         <p:cNvPr id="1" name="">
           <a:extLst>
             <a:ext uri="{FF2B5EF4-FFF2-40B4-BE49-F238E27FC236}">
-              <a16:creationId xmlns:a16="http://schemas.microsoft.com/office/drawing/2014/main" id="{6C9CD921-614C-1EC2-46D6-F21839D667AC}"/>
+              <a16:creationId xmlns:a16="http://schemas.microsoft.com/office/drawing/2014/main" id="{B53F31DB-5838-DE6C-9574-F1645EA22F2D}"/>
             </a:ext>
           </a:extLst>
         </p:cNvPr>
@@ -6859,7 +7363,7 @@
           <p:cNvPr id="3" name="Zástupný objekt pre obsah 2">
             <a:extLst>
               <a:ext uri="{FF2B5EF4-FFF2-40B4-BE49-F238E27FC236}">
-                <a16:creationId xmlns:a16="http://schemas.microsoft.com/office/drawing/2014/main" id="{BB49D91E-39C1-470B-933C-A6CDA1FC0FEF}"/>
+                <a16:creationId xmlns:a16="http://schemas.microsoft.com/office/drawing/2014/main" id="{DB982F48-1B1A-BF43-4962-7BB1F0F06A0E}"/>
               </a:ext>
             </a:extLst>
           </p:cNvPr>
@@ -6872,8 +7376,8 @@
         </p:nvSpPr>
         <p:spPr>
           <a:xfrm>
-            <a:off x="466344" y="1580558"/>
-            <a:ext cx="11329416" cy="4847673"/>
+            <a:off x="274320" y="1516550"/>
+            <a:ext cx="11759184" cy="4847673"/>
           </a:xfrm>
         </p:spPr>
         <p:txBody>
@@ -6882,247 +7386,459 @@
           </a:bodyPr>
           <a:lstStyle/>
           <a:p>
-            <a:pPr marL="514350" indent="-514350">
-              <a:buFont typeface="+mj-lt"/>
-              <a:buAutoNum type="arabicPeriod"/>
+            <a:pPr marL="0" indent="0">
+              <a:buNone/>
             </a:pPr>
             <a:r>
               <a:rPr lang="sk-SK" dirty="0"/>
-              <a:t>Vytvorte si v projekte adresár </a:t>
-            </a:r>
-            <a:r>
-              <a:rPr lang="sk-SK" dirty="0" err="1"/>
-              <a:t>assets</a:t>
-            </a:r>
-            <a:endParaRPr lang="sk-SK" dirty="0"/>
-          </a:p>
-          <a:p>
-            <a:pPr marL="514350" indent="-514350">
-              <a:buFont typeface="+mj-lt"/>
-              <a:buAutoNum type="arabicPeriod"/>
-            </a:pPr>
+              <a:t>Vytvorte novú triedu </a:t>
+            </a:r>
+            <a:r>
+              <a:rPr lang="sk-SK" sz="2400" dirty="0" err="1">
+                <a:highlight>
+                  <a:srgbClr val="FFFF00"/>
+                </a:highlight>
+                <a:latin typeface="Consolas" panose="020B0609020204030204" pitchFamily="49" charset="0"/>
+              </a:rPr>
+              <a:t>sk.spse.hangman.TextoveUI</a:t>
+            </a:r>
             <a:r>
               <a:rPr lang="sk-SK" dirty="0"/>
-              <a:t>Do tohto adresára stiahnite súbor zvierata.txt so stránky </a:t>
-            </a:r>
-            <a:r>
-              <a:rPr lang="sk-SK" dirty="0">
-                <a:hlinkClick r:id="rId2"/>
-              </a:rPr>
-              <a:t>https://oop.wagjo.com/assets/zvierata.txt</a:t>
-            </a:r>
-            <a:endParaRPr lang="sk-SK" dirty="0"/>
-          </a:p>
-          <a:p>
-            <a:pPr marL="514350" indent="-514350">
-              <a:buFont typeface="+mj-lt"/>
-              <a:buAutoNum type="arabicPeriod"/>
-            </a:pPr>
-            <a:r>
-              <a:rPr lang="sk-SK" dirty="0"/>
-              <a:t>Do triedy </a:t>
-            </a:r>
-            <a:r>
-              <a:rPr lang="sk-SK" dirty="0" err="1">
-                <a:highlight>
-                  <a:srgbClr val="FFFF00"/>
-                </a:highlight>
-                <a:latin typeface="Consolas" panose="020B0609020204030204" pitchFamily="49" charset="0"/>
-              </a:rPr>
-              <a:t>Slovnik</a:t>
-            </a:r>
-            <a:r>
-              <a:rPr lang="sk-SK" dirty="0"/>
-              <a:t> pridajte továrenskú metódu </a:t>
-            </a:r>
-            <a:r>
-              <a:rPr lang="sk-SK" dirty="0" err="1">
-                <a:highlight>
-                  <a:srgbClr val="FFFF00"/>
-                </a:highlight>
-                <a:latin typeface="Consolas" panose="020B0609020204030204" pitchFamily="49" charset="0"/>
-              </a:rPr>
-              <a:t>fromFile</a:t>
-            </a:r>
-            <a:r>
-              <a:rPr lang="sk-SK" dirty="0">
-                <a:highlight>
-                  <a:srgbClr val="FFFF00"/>
-                </a:highlight>
-                <a:latin typeface="Consolas" panose="020B0609020204030204" pitchFamily="49" charset="0"/>
-              </a:rPr>
-              <a:t>(</a:t>
-            </a:r>
-            <a:r>
-              <a:rPr lang="sk-SK" dirty="0" err="1">
-                <a:highlight>
-                  <a:srgbClr val="FFFF00"/>
-                </a:highlight>
-                <a:latin typeface="Consolas" panose="020B0609020204030204" pitchFamily="49" charset="0"/>
-              </a:rPr>
-              <a:t>String</a:t>
-            </a:r>
-            <a:r>
-              <a:rPr lang="sk-SK" dirty="0">
-                <a:highlight>
-                  <a:srgbClr val="FFFF00"/>
-                </a:highlight>
-                <a:latin typeface="Consolas" panose="020B0609020204030204" pitchFamily="49" charset="0"/>
-              </a:rPr>
-              <a:t> </a:t>
-            </a:r>
-            <a:r>
-              <a:rPr lang="sk-SK" dirty="0" err="1">
-                <a:highlight>
-                  <a:srgbClr val="FFFF00"/>
-                </a:highlight>
-                <a:latin typeface="Consolas" panose="020B0609020204030204" pitchFamily="49" charset="0"/>
-              </a:rPr>
-              <a:t>kategoria</a:t>
-            </a:r>
-            <a:r>
-              <a:rPr lang="sk-SK" dirty="0">
-                <a:highlight>
-                  <a:srgbClr val="FFFF00"/>
-                </a:highlight>
-                <a:latin typeface="Consolas" panose="020B0609020204030204" pitchFamily="49" charset="0"/>
-              </a:rPr>
-              <a:t>, </a:t>
-            </a:r>
-            <a:r>
-              <a:rPr lang="sk-SK" dirty="0" err="1">
-                <a:highlight>
-                  <a:srgbClr val="FFFF00"/>
-                </a:highlight>
-                <a:latin typeface="Consolas" panose="020B0609020204030204" pitchFamily="49" charset="0"/>
-              </a:rPr>
-              <a:t>String</a:t>
-            </a:r>
-            <a:r>
-              <a:rPr lang="sk-SK" dirty="0">
-                <a:highlight>
-                  <a:srgbClr val="FFFF00"/>
-                </a:highlight>
-                <a:latin typeface="Consolas" panose="020B0609020204030204" pitchFamily="49" charset="0"/>
-              </a:rPr>
-              <a:t> </a:t>
-            </a:r>
-            <a:r>
-              <a:rPr lang="sk-SK" dirty="0" err="1">
-                <a:highlight>
-                  <a:srgbClr val="FFFF00"/>
-                </a:highlight>
-                <a:latin typeface="Consolas" panose="020B0609020204030204" pitchFamily="49" charset="0"/>
-              </a:rPr>
-              <a:t>nazov</a:t>
-            </a:r>
-            <a:r>
-              <a:rPr lang="sk-SK" dirty="0">
-                <a:highlight>
-                  <a:srgbClr val="FFFF00"/>
-                </a:highlight>
-                <a:latin typeface="Consolas" panose="020B0609020204030204" pitchFamily="49" charset="0"/>
-              </a:rPr>
-              <a:t>)</a:t>
-            </a:r>
-            <a:r>
-              <a:rPr lang="sk-SK" dirty="0"/>
-              <a:t> s kódom z učebnice</a:t>
-            </a:r>
-          </a:p>
-          <a:p>
-            <a:pPr marL="514350" indent="-514350">
-              <a:buFont typeface="+mj-lt"/>
-              <a:buAutoNum type="arabicPeriod"/>
-            </a:pPr>
-            <a:r>
-              <a:rPr lang="sk-SK" dirty="0"/>
-              <a:t>Importujte všetky novo používané triedy, IDE vám v tom vie pomôcť</a:t>
-            </a:r>
-          </a:p>
-          <a:p>
-            <a:pPr marL="514350" indent="-514350">
-              <a:buFont typeface="+mj-lt"/>
-              <a:buAutoNum type="arabicPeriod"/>
-            </a:pPr>
-            <a:r>
-              <a:rPr lang="sk-SK" dirty="0"/>
-              <a:t>Do triedy </a:t>
-            </a:r>
-            <a:r>
-              <a:rPr lang="sk-SK" dirty="0">
-                <a:highlight>
-                  <a:srgbClr val="FFFF00"/>
-                </a:highlight>
-                <a:latin typeface="Consolas" panose="020B0609020204030204" pitchFamily="49" charset="0"/>
-              </a:rPr>
-              <a:t>Hra</a:t>
-            </a:r>
-            <a:r>
-              <a:rPr lang="sk-SK" dirty="0"/>
-              <a:t> pridajte statickú metódu </a:t>
-            </a:r>
-            <a:r>
-              <a:rPr lang="sk-SK" dirty="0" err="1">
-                <a:highlight>
-                  <a:srgbClr val="FFFF00"/>
-                </a:highlight>
-                <a:latin typeface="Consolas" panose="020B0609020204030204" pitchFamily="49" charset="0"/>
-              </a:rPr>
-              <a:t>getSlovnikZvierat</a:t>
-            </a:r>
-            <a:r>
-              <a:rPr lang="sk-SK" dirty="0">
-                <a:highlight>
-                  <a:srgbClr val="FFFF00"/>
-                </a:highlight>
-                <a:latin typeface="Consolas" panose="020B0609020204030204" pitchFamily="49" charset="0"/>
-              </a:rPr>
-              <a:t>()</a:t>
-            </a:r>
-            <a:r>
-              <a:rPr lang="sk-SK" dirty="0"/>
-              <a:t>, ktorá vráti nový slovník zvierat, kód je v učebnici</a:t>
-            </a:r>
-          </a:p>
-          <a:p>
-            <a:pPr marL="514350" indent="-514350">
-              <a:buFont typeface="+mj-lt"/>
-              <a:buAutoNum type="arabicPeriod"/>
-            </a:pPr>
-            <a:r>
-              <a:rPr lang="sk-SK" dirty="0"/>
-              <a:t>Upravte metódu </a:t>
-            </a:r>
-            <a:r>
-              <a:rPr lang="sk-SK" dirty="0" err="1">
-                <a:highlight>
-                  <a:srgbClr val="FFFF00"/>
-                </a:highlight>
-                <a:latin typeface="Consolas" panose="020B0609020204030204" pitchFamily="49" charset="0"/>
-              </a:rPr>
-              <a:t>novaTextovaHra</a:t>
-            </a:r>
-            <a:r>
-              <a:rPr lang="sk-SK" dirty="0">
-                <a:highlight>
-                  <a:srgbClr val="FFFF00"/>
-                </a:highlight>
-                <a:latin typeface="Consolas" panose="020B0609020204030204" pitchFamily="49" charset="0"/>
-              </a:rPr>
-              <a:t>()</a:t>
-            </a:r>
-            <a:r>
-              <a:rPr lang="sk-SK" dirty="0"/>
-              <a:t> tak, aby sa použil slovník zvierat</a:t>
-            </a:r>
-          </a:p>
-          <a:p>
-            <a:pPr marL="514350" indent="-514350">
-              <a:buFont typeface="+mj-lt"/>
-              <a:buAutoNum type="arabicPeriod"/>
+              <a:t>:</a:t>
+            </a:r>
+          </a:p>
+          <a:p>
+            <a:pPr marL="0" indent="0">
+              <a:buNone/>
             </a:pPr>
             <a:endParaRPr lang="sk-SK" dirty="0"/>
+          </a:p>
+          <a:p>
+            <a:pPr marL="0" indent="0">
+              <a:lnSpc>
+                <a:spcPct val="100000"/>
+              </a:lnSpc>
+              <a:spcBef>
+                <a:spcPts val="0"/>
+              </a:spcBef>
+              <a:buNone/>
+            </a:pPr>
+            <a:r>
+              <a:rPr lang="sk-SK" sz="2400" dirty="0" err="1">
+                <a:highlight>
+                  <a:srgbClr val="FFFF00"/>
+                </a:highlight>
+                <a:latin typeface="Consolas" panose="020B0609020204030204" pitchFamily="49" charset="0"/>
+              </a:rPr>
+              <a:t>package</a:t>
+            </a:r>
+            <a:r>
+              <a:rPr lang="sk-SK" sz="2400" dirty="0">
+                <a:highlight>
+                  <a:srgbClr val="FFFF00"/>
+                </a:highlight>
+                <a:latin typeface="Consolas" panose="020B0609020204030204" pitchFamily="49" charset="0"/>
+              </a:rPr>
+              <a:t> </a:t>
+            </a:r>
+            <a:r>
+              <a:rPr lang="sk-SK" sz="2400" dirty="0" err="1">
+                <a:highlight>
+                  <a:srgbClr val="FFFF00"/>
+                </a:highlight>
+                <a:latin typeface="Consolas" panose="020B0609020204030204" pitchFamily="49" charset="0"/>
+              </a:rPr>
+              <a:t>sk.spse.hangman</a:t>
+            </a:r>
+            <a:r>
+              <a:rPr lang="sk-SK" sz="2400" dirty="0">
+                <a:highlight>
+                  <a:srgbClr val="FFFF00"/>
+                </a:highlight>
+                <a:latin typeface="Consolas" panose="020B0609020204030204" pitchFamily="49" charset="0"/>
+              </a:rPr>
+              <a:t>;</a:t>
+            </a:r>
+          </a:p>
+          <a:p>
+            <a:pPr marL="0" indent="0">
+              <a:lnSpc>
+                <a:spcPct val="100000"/>
+              </a:lnSpc>
+              <a:spcBef>
+                <a:spcPts val="0"/>
+              </a:spcBef>
+              <a:buNone/>
+            </a:pPr>
+            <a:endParaRPr lang="sk-SK" sz="2400" dirty="0">
+              <a:highlight>
+                <a:srgbClr val="FFFF00"/>
+              </a:highlight>
+              <a:latin typeface="Consolas" panose="020B0609020204030204" pitchFamily="49" charset="0"/>
+            </a:endParaRPr>
+          </a:p>
+          <a:p>
+            <a:pPr marL="0" indent="0">
+              <a:lnSpc>
+                <a:spcPct val="100000"/>
+              </a:lnSpc>
+              <a:spcBef>
+                <a:spcPts val="0"/>
+              </a:spcBef>
+              <a:buNone/>
+            </a:pPr>
+            <a:r>
+              <a:rPr lang="sk-SK" sz="2400" dirty="0">
+                <a:highlight>
+                  <a:srgbClr val="FFFF00"/>
+                </a:highlight>
+                <a:latin typeface="Consolas" panose="020B0609020204030204" pitchFamily="49" charset="0"/>
+              </a:rPr>
+              <a:t>import </a:t>
+            </a:r>
+            <a:r>
+              <a:rPr lang="sk-SK" sz="2400" dirty="0" err="1">
+                <a:highlight>
+                  <a:srgbClr val="FFFF00"/>
+                </a:highlight>
+                <a:latin typeface="Consolas" panose="020B0609020204030204" pitchFamily="49" charset="0"/>
+              </a:rPr>
+              <a:t>java.util.Scanner</a:t>
+            </a:r>
+            <a:r>
+              <a:rPr lang="sk-SK" sz="2400" dirty="0">
+                <a:highlight>
+                  <a:srgbClr val="FFFF00"/>
+                </a:highlight>
+                <a:latin typeface="Consolas" panose="020B0609020204030204" pitchFamily="49" charset="0"/>
+              </a:rPr>
+              <a:t>;</a:t>
+            </a:r>
+          </a:p>
+          <a:p>
+            <a:pPr marL="0" indent="0">
+              <a:lnSpc>
+                <a:spcPct val="100000"/>
+              </a:lnSpc>
+              <a:spcBef>
+                <a:spcPts val="0"/>
+              </a:spcBef>
+              <a:buNone/>
+            </a:pPr>
+            <a:endParaRPr lang="sk-SK" sz="2400" dirty="0">
+              <a:highlight>
+                <a:srgbClr val="FFFF00"/>
+              </a:highlight>
+              <a:latin typeface="Consolas" panose="020B0609020204030204" pitchFamily="49" charset="0"/>
+            </a:endParaRPr>
+          </a:p>
+          <a:p>
+            <a:pPr marL="0" indent="0">
+              <a:lnSpc>
+                <a:spcPct val="100000"/>
+              </a:lnSpc>
+              <a:spcBef>
+                <a:spcPts val="0"/>
+              </a:spcBef>
+              <a:buNone/>
+            </a:pPr>
+            <a:r>
+              <a:rPr lang="sk-SK" sz="2400" dirty="0" err="1">
+                <a:highlight>
+                  <a:srgbClr val="FFFF00"/>
+                </a:highlight>
+                <a:latin typeface="Consolas" panose="020B0609020204030204" pitchFamily="49" charset="0"/>
+              </a:rPr>
+              <a:t>public</a:t>
+            </a:r>
+            <a:r>
+              <a:rPr lang="sk-SK" sz="2400" dirty="0">
+                <a:highlight>
+                  <a:srgbClr val="FFFF00"/>
+                </a:highlight>
+                <a:latin typeface="Consolas" panose="020B0609020204030204" pitchFamily="49" charset="0"/>
+              </a:rPr>
+              <a:t> </a:t>
+            </a:r>
+            <a:r>
+              <a:rPr lang="sk-SK" sz="2400" dirty="0" err="1">
+                <a:highlight>
+                  <a:srgbClr val="FFFF00"/>
+                </a:highlight>
+                <a:latin typeface="Consolas" panose="020B0609020204030204" pitchFamily="49" charset="0"/>
+              </a:rPr>
+              <a:t>class</a:t>
+            </a:r>
+            <a:r>
+              <a:rPr lang="sk-SK" sz="2400" dirty="0">
+                <a:highlight>
+                  <a:srgbClr val="FFFF00"/>
+                </a:highlight>
+                <a:latin typeface="Consolas" panose="020B0609020204030204" pitchFamily="49" charset="0"/>
+              </a:rPr>
+              <a:t> </a:t>
+            </a:r>
+            <a:r>
+              <a:rPr lang="sk-SK" sz="2400" dirty="0" err="1">
+                <a:highlight>
+                  <a:srgbClr val="FFFF00"/>
+                </a:highlight>
+                <a:latin typeface="Consolas" panose="020B0609020204030204" pitchFamily="49" charset="0"/>
+              </a:rPr>
+              <a:t>TextoveUI</a:t>
+            </a:r>
+            <a:r>
+              <a:rPr lang="sk-SK" sz="2400" dirty="0">
+                <a:highlight>
+                  <a:srgbClr val="FFFF00"/>
+                </a:highlight>
+                <a:latin typeface="Consolas" panose="020B0609020204030204" pitchFamily="49" charset="0"/>
+              </a:rPr>
+              <a:t> {</a:t>
+            </a:r>
+          </a:p>
+          <a:p>
+            <a:pPr marL="0" indent="0">
+              <a:lnSpc>
+                <a:spcPct val="100000"/>
+              </a:lnSpc>
+              <a:spcBef>
+                <a:spcPts val="0"/>
+              </a:spcBef>
+              <a:buNone/>
+            </a:pPr>
+            <a:r>
+              <a:rPr lang="sk-SK" sz="2400" dirty="0">
+                <a:highlight>
+                  <a:srgbClr val="FFFF00"/>
+                </a:highlight>
+                <a:latin typeface="Consolas" panose="020B0609020204030204" pitchFamily="49" charset="0"/>
+              </a:rPr>
+              <a:t>    </a:t>
+            </a:r>
+            <a:r>
+              <a:rPr lang="sk-SK" sz="2400" dirty="0" err="1">
+                <a:highlight>
+                  <a:srgbClr val="FFFF00"/>
+                </a:highlight>
+                <a:latin typeface="Consolas" panose="020B0609020204030204" pitchFamily="49" charset="0"/>
+              </a:rPr>
+              <a:t>private</a:t>
+            </a:r>
+            <a:r>
+              <a:rPr lang="sk-SK" sz="2400" dirty="0">
+                <a:highlight>
+                  <a:srgbClr val="FFFF00"/>
+                </a:highlight>
+                <a:latin typeface="Consolas" panose="020B0609020204030204" pitchFamily="49" charset="0"/>
+              </a:rPr>
+              <a:t> </a:t>
+            </a:r>
+            <a:r>
+              <a:rPr lang="sk-SK" sz="2400" dirty="0" err="1">
+                <a:highlight>
+                  <a:srgbClr val="FFFF00"/>
+                </a:highlight>
+                <a:latin typeface="Consolas" panose="020B0609020204030204" pitchFamily="49" charset="0"/>
+              </a:rPr>
+              <a:t>Scanner</a:t>
+            </a:r>
+            <a:r>
+              <a:rPr lang="sk-SK" sz="2400" dirty="0">
+                <a:highlight>
+                  <a:srgbClr val="FFFF00"/>
+                </a:highlight>
+                <a:latin typeface="Consolas" panose="020B0609020204030204" pitchFamily="49" charset="0"/>
+              </a:rPr>
+              <a:t> </a:t>
+            </a:r>
+            <a:r>
+              <a:rPr lang="sk-SK" sz="2400" dirty="0" err="1">
+                <a:highlight>
+                  <a:srgbClr val="FFFF00"/>
+                </a:highlight>
+                <a:latin typeface="Consolas" panose="020B0609020204030204" pitchFamily="49" charset="0"/>
+              </a:rPr>
+              <a:t>scanner</a:t>
+            </a:r>
+            <a:r>
+              <a:rPr lang="sk-SK" sz="2400" dirty="0">
+                <a:highlight>
+                  <a:srgbClr val="FFFF00"/>
+                </a:highlight>
+                <a:latin typeface="Consolas" panose="020B0609020204030204" pitchFamily="49" charset="0"/>
+              </a:rPr>
+              <a:t>;</a:t>
+            </a:r>
+          </a:p>
+          <a:p>
+            <a:pPr marL="0" indent="0">
+              <a:lnSpc>
+                <a:spcPct val="100000"/>
+              </a:lnSpc>
+              <a:spcBef>
+                <a:spcPts val="0"/>
+              </a:spcBef>
+              <a:buNone/>
+            </a:pPr>
+            <a:endParaRPr lang="sk-SK" sz="2400" dirty="0">
+              <a:highlight>
+                <a:srgbClr val="FFFF00"/>
+              </a:highlight>
+              <a:latin typeface="Consolas" panose="020B0609020204030204" pitchFamily="49" charset="0"/>
+            </a:endParaRPr>
+          </a:p>
+          <a:p>
+            <a:pPr marL="0" indent="0">
+              <a:lnSpc>
+                <a:spcPct val="100000"/>
+              </a:lnSpc>
+              <a:spcBef>
+                <a:spcPts val="0"/>
+              </a:spcBef>
+              <a:buNone/>
+            </a:pPr>
+            <a:r>
+              <a:rPr lang="sk-SK" sz="2400" dirty="0">
+                <a:highlight>
+                  <a:srgbClr val="FFFF00"/>
+                </a:highlight>
+                <a:latin typeface="Consolas" panose="020B0609020204030204" pitchFamily="49" charset="0"/>
+              </a:rPr>
+              <a:t>    </a:t>
+            </a:r>
+            <a:r>
+              <a:rPr lang="sk-SK" sz="2400" dirty="0" err="1">
+                <a:highlight>
+                  <a:srgbClr val="FFFF00"/>
+                </a:highlight>
+                <a:latin typeface="Consolas" panose="020B0609020204030204" pitchFamily="49" charset="0"/>
+              </a:rPr>
+              <a:t>public</a:t>
+            </a:r>
+            <a:r>
+              <a:rPr lang="sk-SK" sz="2400" dirty="0">
+                <a:highlight>
+                  <a:srgbClr val="FFFF00"/>
+                </a:highlight>
+                <a:latin typeface="Consolas" panose="020B0609020204030204" pitchFamily="49" charset="0"/>
+              </a:rPr>
+              <a:t> </a:t>
+            </a:r>
+            <a:r>
+              <a:rPr lang="sk-SK" sz="2400" dirty="0" err="1">
+                <a:highlight>
+                  <a:srgbClr val="FFFF00"/>
+                </a:highlight>
+                <a:latin typeface="Consolas" panose="020B0609020204030204" pitchFamily="49" charset="0"/>
+              </a:rPr>
+              <a:t>TextoveUI</a:t>
+            </a:r>
+            <a:r>
+              <a:rPr lang="sk-SK" sz="2400" dirty="0">
+                <a:highlight>
+                  <a:srgbClr val="FFFF00"/>
+                </a:highlight>
+                <a:latin typeface="Consolas" panose="020B0609020204030204" pitchFamily="49" charset="0"/>
+              </a:rPr>
+              <a:t>() {</a:t>
+            </a:r>
+          </a:p>
+          <a:p>
+            <a:pPr marL="0" indent="0">
+              <a:lnSpc>
+                <a:spcPct val="100000"/>
+              </a:lnSpc>
+              <a:spcBef>
+                <a:spcPts val="0"/>
+              </a:spcBef>
+              <a:buNone/>
+            </a:pPr>
+            <a:r>
+              <a:rPr lang="sk-SK" sz="2400" dirty="0">
+                <a:highlight>
+                  <a:srgbClr val="FFFF00"/>
+                </a:highlight>
+                <a:latin typeface="Consolas" panose="020B0609020204030204" pitchFamily="49" charset="0"/>
+              </a:rPr>
+              <a:t>        </a:t>
+            </a:r>
+            <a:r>
+              <a:rPr lang="sk-SK" sz="2400" dirty="0" err="1">
+                <a:highlight>
+                  <a:srgbClr val="FFFF00"/>
+                </a:highlight>
+                <a:latin typeface="Consolas" panose="020B0609020204030204" pitchFamily="49" charset="0"/>
+              </a:rPr>
+              <a:t>this.scanner</a:t>
+            </a:r>
+            <a:r>
+              <a:rPr lang="sk-SK" sz="2400" dirty="0">
+                <a:highlight>
+                  <a:srgbClr val="FFFF00"/>
+                </a:highlight>
+                <a:latin typeface="Consolas" panose="020B0609020204030204" pitchFamily="49" charset="0"/>
+              </a:rPr>
+              <a:t> = new </a:t>
+            </a:r>
+            <a:r>
+              <a:rPr lang="sk-SK" sz="2400" dirty="0" err="1">
+                <a:highlight>
+                  <a:srgbClr val="FFFF00"/>
+                </a:highlight>
+                <a:latin typeface="Consolas" panose="020B0609020204030204" pitchFamily="49" charset="0"/>
+              </a:rPr>
+              <a:t>Scanner</a:t>
+            </a:r>
+            <a:r>
+              <a:rPr lang="sk-SK" sz="2400" dirty="0">
+                <a:highlight>
+                  <a:srgbClr val="FFFF00"/>
+                </a:highlight>
+                <a:latin typeface="Consolas" panose="020B0609020204030204" pitchFamily="49" charset="0"/>
+              </a:rPr>
+              <a:t>(System.in);</a:t>
+            </a:r>
+          </a:p>
+          <a:p>
+            <a:pPr marL="0" indent="0">
+              <a:lnSpc>
+                <a:spcPct val="100000"/>
+              </a:lnSpc>
+              <a:spcBef>
+                <a:spcPts val="0"/>
+              </a:spcBef>
+              <a:buNone/>
+            </a:pPr>
+            <a:r>
+              <a:rPr lang="sk-SK" sz="2400" dirty="0">
+                <a:highlight>
+                  <a:srgbClr val="FFFF00"/>
+                </a:highlight>
+                <a:latin typeface="Consolas" panose="020B0609020204030204" pitchFamily="49" charset="0"/>
+              </a:rPr>
+              <a:t>    }</a:t>
+            </a:r>
+          </a:p>
+          <a:p>
+            <a:pPr marL="0" indent="0">
+              <a:lnSpc>
+                <a:spcPct val="100000"/>
+              </a:lnSpc>
+              <a:spcBef>
+                <a:spcPts val="0"/>
+              </a:spcBef>
+              <a:buNone/>
+            </a:pPr>
+            <a:r>
+              <a:rPr lang="sk-SK" sz="2400" dirty="0">
+                <a:highlight>
+                  <a:srgbClr val="FFFF00"/>
+                </a:highlight>
+                <a:latin typeface="Consolas" panose="020B0609020204030204" pitchFamily="49" charset="0"/>
+              </a:rPr>
+              <a:t>}</a:t>
+            </a:r>
           </a:p>
         </p:txBody>
       </p:sp>
@@ -7131,7 +7847,7 @@
           <p:cNvPr id="5" name="Nadpis 4">
             <a:extLst>
               <a:ext uri="{FF2B5EF4-FFF2-40B4-BE49-F238E27FC236}">
-                <a16:creationId xmlns:a16="http://schemas.microsoft.com/office/drawing/2014/main" id="{066CE4F9-1E18-0B5D-FCA6-D2FFFC6ACD1F}"/>
+                <a16:creationId xmlns:a16="http://schemas.microsoft.com/office/drawing/2014/main" id="{427C037D-C4C8-0DAF-3BD6-95899342D12B}"/>
               </a:ext>
             </a:extLst>
           </p:cNvPr>
@@ -7151,15 +7867,20 @@
           <a:p>
             <a:r>
               <a:rPr lang="sk-SK" dirty="0"/>
-              <a:t>Úloha 8.7: Slovník so súboru</a:t>
-            </a:r>
+              <a:t>Úloha 7.5: Trieda </a:t>
+            </a:r>
+            <a:r>
+              <a:rPr lang="sk-SK" dirty="0" err="1"/>
+              <a:t>TextoveUI</a:t>
+            </a:r>
+            <a:endParaRPr lang="sk-SK" dirty="0"/>
           </a:p>
         </p:txBody>
       </p:sp>
     </p:spTree>
     <p:extLst>
       <p:ext uri="{BB962C8B-B14F-4D97-AF65-F5344CB8AC3E}">
-        <p14:creationId xmlns:p14="http://schemas.microsoft.com/office/powerpoint/2010/main" val="1321521103"/>
+        <p14:creationId xmlns:p14="http://schemas.microsoft.com/office/powerpoint/2010/main" val="1772932859"/>
       </p:ext>
     </p:extLst>
   </p:cSld>

</xml_diff>